<commit_message>
Updates to slides, convex solver, notebook, and new utilities for drawing trajectories with covariance ellipses
</commit_message>
<xml_diff>
--- a/Documents/Qual Exam.pptx
+++ b/Documents/Qual Exam.pptx
@@ -5,27 +5,31 @@
     <p:sldMasterId id="2147483660" r:id="rId1"/>
   </p:sldMasterIdLst>
   <p:notesMasterIdLst>
-    <p:notesMasterId r:id="rId20"/>
+    <p:notesMasterId r:id="rId24"/>
   </p:notesMasterIdLst>
   <p:sldIdLst>
     <p:sldId id="275" r:id="rId2"/>
-    <p:sldId id="260" r:id="rId3"/>
-    <p:sldId id="263" r:id="rId4"/>
-    <p:sldId id="262" r:id="rId5"/>
-    <p:sldId id="261" r:id="rId6"/>
-    <p:sldId id="264" r:id="rId7"/>
-    <p:sldId id="265" r:id="rId8"/>
-    <p:sldId id="266" r:id="rId9"/>
-    <p:sldId id="267" r:id="rId10"/>
-    <p:sldId id="268" r:id="rId11"/>
-    <p:sldId id="269" r:id="rId12"/>
-    <p:sldId id="270" r:id="rId13"/>
-    <p:sldId id="271" r:id="rId14"/>
-    <p:sldId id="272" r:id="rId15"/>
-    <p:sldId id="273" r:id="rId16"/>
-    <p:sldId id="274" r:id="rId17"/>
-    <p:sldId id="277" r:id="rId18"/>
-    <p:sldId id="278" r:id="rId19"/>
+    <p:sldId id="280" r:id="rId3"/>
+    <p:sldId id="281" r:id="rId4"/>
+    <p:sldId id="260" r:id="rId5"/>
+    <p:sldId id="263" r:id="rId6"/>
+    <p:sldId id="262" r:id="rId7"/>
+    <p:sldId id="279" r:id="rId8"/>
+    <p:sldId id="261" r:id="rId9"/>
+    <p:sldId id="282" r:id="rId10"/>
+    <p:sldId id="264" r:id="rId11"/>
+    <p:sldId id="265" r:id="rId12"/>
+    <p:sldId id="266" r:id="rId13"/>
+    <p:sldId id="267" r:id="rId14"/>
+    <p:sldId id="268" r:id="rId15"/>
+    <p:sldId id="269" r:id="rId16"/>
+    <p:sldId id="270" r:id="rId17"/>
+    <p:sldId id="271" r:id="rId18"/>
+    <p:sldId id="272" r:id="rId19"/>
+    <p:sldId id="273" r:id="rId20"/>
+    <p:sldId id="274" r:id="rId21"/>
+    <p:sldId id="277" r:id="rId22"/>
+    <p:sldId id="278" r:id="rId23"/>
   </p:sldIdLst>
   <p:sldSz cx="9144000" cy="6858000" type="screen4x3"/>
   <p:notesSz cx="6858000" cy="9144000"/>
@@ -130,10 +134,14 @@
         <p14:section name="Default Section" id="{C65E65E8-8D10-45BF-9402-B68D0796393C}">
           <p14:sldIdLst>
             <p14:sldId id="275"/>
+            <p14:sldId id="280"/>
+            <p14:sldId id="281"/>
             <p14:sldId id="260"/>
             <p14:sldId id="263"/>
             <p14:sldId id="262"/>
+            <p14:sldId id="279"/>
             <p14:sldId id="261"/>
+            <p14:sldId id="282"/>
           </p14:sldIdLst>
         </p14:section>
         <p14:section name="Convex Update" id="{84CEB627-9745-4B28-B0BB-7AB7D074EB20}">
@@ -248,7 +256,7 @@
           <a:p>
             <a:fld id="{AEBE7A69-640E-417A-A462-9E49D1368F72}" type="datetimeFigureOut">
               <a:rPr lang="en-US" smtClean="0"/>
-              <a:t>11/6/2018</a:t>
+              <a:t>11/20/2018</a:t>
             </a:fld>
             <a:endParaRPr lang="en-US"/>
           </a:p>
@@ -615,7 +623,7 @@
           <a:p>
             <a:fld id="{3F6F7F58-9784-4543-B74A-850450AD4D21}" type="slidenum">
               <a:rPr lang="en-US" smtClean="0"/>
-              <a:t>5</a:t>
+              <a:t>8</a:t>
             </a:fld>
             <a:endParaRPr lang="en-US"/>
           </a:p>
@@ -715,7 +723,7 @@
           <a:p>
             <a:fld id="{4BAF2748-3477-4185-BA7E-C3C95536F5B5}" type="slidenum">
               <a:rPr lang="en-US" smtClean="0"/>
-              <a:t>6</a:t>
+              <a:t>10</a:t>
             </a:fld>
             <a:endParaRPr lang="en-US"/>
           </a:p>
@@ -837,7 +845,7 @@
           <a:p>
             <a:fld id="{4BAF2748-3477-4185-BA7E-C3C95536F5B5}" type="slidenum">
               <a:rPr lang="en-US" smtClean="0"/>
-              <a:t>7</a:t>
+              <a:t>11</a:t>
             </a:fld>
             <a:endParaRPr lang="en-US"/>
           </a:p>
@@ -952,7 +960,7 @@
           <a:p>
             <a:fld id="{4BAF2748-3477-4185-BA7E-C3C95536F5B5}" type="slidenum">
               <a:rPr lang="en-US" smtClean="0"/>
-              <a:t>8</a:t>
+              <a:t>12</a:t>
             </a:fld>
             <a:endParaRPr lang="en-US"/>
           </a:p>
@@ -1044,7 +1052,7 @@
           <a:p>
             <a:fld id="{4BAF2748-3477-4185-BA7E-C3C95536F5B5}" type="slidenum">
               <a:rPr lang="en-US" smtClean="0"/>
-              <a:t>10</a:t>
+              <a:t>14</a:t>
             </a:fld>
             <a:endParaRPr lang="en-US"/>
           </a:p>
@@ -1128,7 +1136,7 @@
           <a:p>
             <a:fld id="{4BAF2748-3477-4185-BA7E-C3C95536F5B5}" type="slidenum">
               <a:rPr lang="en-US" smtClean="0"/>
-              <a:t>11</a:t>
+              <a:t>15</a:t>
             </a:fld>
             <a:endParaRPr lang="en-US"/>
           </a:p>
@@ -1226,7 +1234,7 @@
           <a:p>
             <a:fld id="{4BAF2748-3477-4185-BA7E-C3C95536F5B5}" type="slidenum">
               <a:rPr lang="en-US" smtClean="0"/>
-              <a:t>12</a:t>
+              <a:t>16</a:t>
             </a:fld>
             <a:endParaRPr lang="en-US"/>
           </a:p>
@@ -1332,7 +1340,7 @@
           <a:p>
             <a:fld id="{4BAF2748-3477-4185-BA7E-C3C95536F5B5}" type="slidenum">
               <a:rPr lang="en-US" smtClean="0"/>
-              <a:t>13</a:t>
+              <a:t>17</a:t>
             </a:fld>
             <a:endParaRPr lang="en-US"/>
           </a:p>
@@ -1438,7 +1446,7 @@
           <a:p>
             <a:fld id="{97591DF4-FFBB-4E8C-8E87-255A2EADF72A}" type="slidenum">
               <a:rPr lang="en-US" smtClean="0"/>
-              <a:t>18</a:t>
+              <a:t>22</a:t>
             </a:fld>
             <a:endParaRPr lang="en-US"/>
           </a:p>
@@ -1710,7 +1718,7 @@
           <a:p>
             <a:fld id="{26DDC68E-15D0-3D4A-B51F-159227E9B510}" type="datetimeFigureOut">
               <a:rPr lang="en-US" smtClean="0"/>
-              <a:t>11/6/2018</a:t>
+              <a:t>11/20/2018</a:t>
             </a:fld>
             <a:endParaRPr lang="en-US"/>
           </a:p>
@@ -1920,7 +1928,7 @@
           <a:p>
             <a:fld id="{26DDC68E-15D0-3D4A-B51F-159227E9B510}" type="datetimeFigureOut">
               <a:rPr lang="en-US" smtClean="0"/>
-              <a:t>11/6/2018</a:t>
+              <a:t>11/20/2018</a:t>
             </a:fld>
             <a:endParaRPr lang="en-US"/>
           </a:p>
@@ -2130,7 +2138,7 @@
           <a:p>
             <a:fld id="{26DDC68E-15D0-3D4A-B51F-159227E9B510}" type="datetimeFigureOut">
               <a:rPr lang="en-US" smtClean="0"/>
-              <a:t>11/6/2018</a:t>
+              <a:t>11/20/2018</a:t>
             </a:fld>
             <a:endParaRPr lang="en-US"/>
           </a:p>
@@ -2404,7 +2412,7 @@
           <a:p>
             <a:fld id="{26DDC68E-15D0-3D4A-B51F-159227E9B510}" type="datetimeFigureOut">
               <a:rPr lang="en-US" smtClean="0"/>
-              <a:t>11/6/2018</a:t>
+              <a:t>11/20/2018</a:t>
             </a:fld>
             <a:endParaRPr lang="en-US"/>
           </a:p>
@@ -2674,7 +2682,7 @@
           <a:p>
             <a:fld id="{26DDC68E-15D0-3D4A-B51F-159227E9B510}" type="datetimeFigureOut">
               <a:rPr lang="en-US" smtClean="0"/>
-              <a:t>11/6/2018</a:t>
+              <a:t>11/20/2018</a:t>
             </a:fld>
             <a:endParaRPr lang="en-US"/>
           </a:p>
@@ -3080,7 +3088,7 @@
           <a:p>
             <a:fld id="{26DDC68E-15D0-3D4A-B51F-159227E9B510}" type="datetimeFigureOut">
               <a:rPr lang="en-US" smtClean="0"/>
-              <a:t>11/6/2018</a:t>
+              <a:t>11/20/2018</a:t>
             </a:fld>
             <a:endParaRPr lang="en-US"/>
           </a:p>
@@ -3230,7 +3238,7 @@
           <a:p>
             <a:fld id="{26DDC68E-15D0-3D4A-B51F-159227E9B510}" type="datetimeFigureOut">
               <a:rPr lang="en-US" smtClean="0"/>
-              <a:t>11/6/2018</a:t>
+              <a:t>11/20/2018</a:t>
             </a:fld>
             <a:endParaRPr lang="en-US"/>
           </a:p>
@@ -3349,7 +3357,7 @@
           <a:p>
             <a:fld id="{26DDC68E-15D0-3D4A-B51F-159227E9B510}" type="datetimeFigureOut">
               <a:rPr lang="en-US" smtClean="0"/>
-              <a:t>11/6/2018</a:t>
+              <a:t>11/20/2018</a:t>
             </a:fld>
             <a:endParaRPr lang="en-US"/>
           </a:p>
@@ -3659,7 +3667,7 @@
           <a:p>
             <a:fld id="{26DDC68E-15D0-3D4A-B51F-159227E9B510}" type="datetimeFigureOut">
               <a:rPr lang="en-US" smtClean="0"/>
-              <a:t>11/6/2018</a:t>
+              <a:t>11/20/2018</a:t>
             </a:fld>
             <a:endParaRPr lang="en-US"/>
           </a:p>
@@ -3949,7 +3957,7 @@
           <a:p>
             <a:fld id="{26DDC68E-15D0-3D4A-B51F-159227E9B510}" type="datetimeFigureOut">
               <a:rPr lang="en-US" smtClean="0"/>
-              <a:t>11/6/2018</a:t>
+              <a:t>11/20/2018</a:t>
             </a:fld>
             <a:endParaRPr lang="en-US"/>
           </a:p>
@@ -4577,6 +4585,506 @@
           <a:chExt cx="0" cy="0"/>
         </a:xfrm>
       </p:grpSpPr>
+      <p:sp>
+        <p:nvSpPr>
+          <p:cNvPr id="2" name="Title 1"/>
+          <p:cNvSpPr>
+            <a:spLocks noGrp="1"/>
+          </p:cNvSpPr>
+          <p:nvPr>
+            <p:ph type="title"/>
+          </p:nvPr>
+        </p:nvSpPr>
+        <p:spPr/>
+        <p:txBody>
+          <a:bodyPr/>
+          <a:lstStyle/>
+          <a:p>
+            <a:r>
+              <a:rPr lang="en-US" dirty="0" smtClean="0"/>
+              <a:t>Introduction</a:t>
+            </a:r>
+            <a:endParaRPr lang="en-US" dirty="0"/>
+          </a:p>
+        </p:txBody>
+      </p:sp>
+      <p:sp>
+        <p:nvSpPr>
+          <p:cNvPr id="3" name="Content Placeholder 2"/>
+          <p:cNvSpPr>
+            <a:spLocks noGrp="1"/>
+          </p:cNvSpPr>
+          <p:nvPr>
+            <p:ph idx="1"/>
+          </p:nvPr>
+        </p:nvSpPr>
+        <p:spPr/>
+        <p:txBody>
+          <a:bodyPr/>
+          <a:lstStyle/>
+          <a:p>
+            <a:r>
+              <a:rPr lang="en-US" dirty="0" smtClean="0"/>
+              <a:t>Future Mars missions will have challenging requirements that necessitate closed-loop entry guidance</a:t>
+            </a:r>
+          </a:p>
+          <a:p>
+            <a:r>
+              <a:rPr lang="en-US" dirty="0" smtClean="0"/>
+              <a:t>The ability to design a trajectory onboard increases autonomy and can be used in entry guidance</a:t>
+            </a:r>
+          </a:p>
+          <a:p>
+            <a:pPr lvl="1"/>
+            <a:r>
+              <a:rPr lang="en-US" dirty="0" smtClean="0"/>
+              <a:t>Trajectory generation can be used in reference tracking methods, or as the basis for a numerical predictor-corrector method via frequent design</a:t>
+            </a:r>
+          </a:p>
+          <a:p>
+            <a:r>
+              <a:rPr lang="en-US" dirty="0" smtClean="0"/>
+              <a:t>Generating an optimal trajectory onboard is difficult due to limited computing resources</a:t>
+            </a:r>
+          </a:p>
+          <a:p>
+            <a:endParaRPr lang="en-US" dirty="0" smtClean="0"/>
+          </a:p>
+          <a:p>
+            <a:endParaRPr lang="en-US" dirty="0"/>
+          </a:p>
+        </p:txBody>
+      </p:sp>
+    </p:spTree>
+    <p:extLst>
+      <p:ext uri="{BB962C8B-B14F-4D97-AF65-F5344CB8AC3E}">
+        <p14:creationId xmlns:p14="http://schemas.microsoft.com/office/powerpoint/2010/main" val="2368961217"/>
+      </p:ext>
+    </p:extLst>
+  </p:cSld>
+  <p:clrMapOvr>
+    <a:masterClrMapping/>
+  </p:clrMapOvr>
+  <p:timing>
+    <p:tnLst>
+      <p:par>
+        <p:cTn id="1" dur="indefinite" restart="never" nodeType="tmRoot"/>
+      </p:par>
+    </p:tnLst>
+  </p:timing>
+</p:sld>
+</file>
+
+<file path=ppt/slides/slide11.xml><?xml version="1.0" encoding="utf-8"?>
+<p:sld xmlns:a="http://schemas.openxmlformats.org/drawingml/2006/main" xmlns:r="http://schemas.openxmlformats.org/officeDocument/2006/relationships" xmlns:p="http://schemas.openxmlformats.org/presentationml/2006/main">
+  <p:cSld>
+    <p:spTree>
+      <p:nvGrpSpPr>
+        <p:cNvPr id="1" name=""/>
+        <p:cNvGrpSpPr/>
+        <p:nvPr/>
+      </p:nvGrpSpPr>
+      <p:grpSpPr>
+        <a:xfrm>
+          <a:off x="0" y="0"/>
+          <a:ext cx="0" cy="0"/>
+          <a:chOff x="0" y="0"/>
+          <a:chExt cx="0" cy="0"/>
+        </a:xfrm>
+      </p:grpSpPr>
+      <p:sp>
+        <p:nvSpPr>
+          <p:cNvPr id="2" name="Title 1"/>
+          <p:cNvSpPr>
+            <a:spLocks noGrp="1"/>
+          </p:cNvSpPr>
+          <p:nvPr>
+            <p:ph type="title"/>
+          </p:nvPr>
+        </p:nvSpPr>
+        <p:spPr/>
+        <p:txBody>
+          <a:bodyPr/>
+          <a:lstStyle/>
+          <a:p>
+            <a:r>
+              <a:rPr lang="en-US" dirty="0" smtClean="0"/>
+              <a:t>Entry Trajectory Updating</a:t>
+            </a:r>
+            <a:endParaRPr lang="en-US" dirty="0"/>
+          </a:p>
+        </p:txBody>
+      </p:sp>
+      <p:sp>
+        <p:nvSpPr>
+          <p:cNvPr id="3" name="Content Placeholder 2"/>
+          <p:cNvSpPr>
+            <a:spLocks noGrp="1"/>
+          </p:cNvSpPr>
+          <p:nvPr>
+            <p:ph idx="1"/>
+          </p:nvPr>
+        </p:nvSpPr>
+        <p:spPr>
+          <a:xfrm>
+            <a:off x="628650" y="1792119"/>
+            <a:ext cx="8361346" cy="5561582"/>
+          </a:xfrm>
+        </p:spPr>
+        <p:txBody>
+          <a:bodyPr/>
+          <a:lstStyle/>
+          <a:p>
+            <a:r>
+              <a:rPr lang="en-US" dirty="0" smtClean="0"/>
+              <a:t>The vehicle enters the atmosphere with a trajectory designed that will deliver it to the target under nominal conditions </a:t>
+            </a:r>
+          </a:p>
+          <a:p>
+            <a:r>
+              <a:rPr lang="en-US" dirty="0"/>
+              <a:t>Under off-nominal conditions, the vehicle will deviate from the trajectory that was planned, </a:t>
+            </a:r>
+            <a:r>
+              <a:rPr lang="en-US" dirty="0" smtClean="0"/>
+              <a:t>sometimes even </a:t>
+            </a:r>
+            <a:r>
+              <a:rPr lang="en-US" dirty="0"/>
+              <a:t>with the aid of </a:t>
+            </a:r>
+            <a:r>
+              <a:rPr lang="en-US" dirty="0" smtClean="0"/>
+              <a:t>closed-loop guidance </a:t>
+            </a:r>
+          </a:p>
+          <a:p>
+            <a:pPr lvl="1"/>
+            <a:r>
+              <a:rPr lang="en-US" dirty="0" smtClean="0"/>
+              <a:t>Vehicle may arrive at the target under poor conditions (e.g. outside of parachute deployment conditions) or may violate important path constraints </a:t>
+            </a:r>
+          </a:p>
+          <a:p>
+            <a:r>
+              <a:rPr lang="en-US" dirty="0" smtClean="0"/>
+              <a:t>Goal: use current estimated vehicle state and redesign a path to the target while satisfying constraints (e.g. parachute deploy conditions, path constraints)</a:t>
+            </a:r>
+          </a:p>
+          <a:p>
+            <a:endParaRPr lang="en-US" dirty="0" smtClean="0"/>
+          </a:p>
+        </p:txBody>
+      </p:sp>
+    </p:spTree>
+    <p:extLst>
+      <p:ext uri="{BB962C8B-B14F-4D97-AF65-F5344CB8AC3E}">
+        <p14:creationId xmlns:p14="http://schemas.microsoft.com/office/powerpoint/2010/main" val="1411460258"/>
+      </p:ext>
+    </p:extLst>
+  </p:cSld>
+  <p:clrMapOvr>
+    <a:masterClrMapping/>
+  </p:clrMapOvr>
+</p:sld>
+</file>
+
+<file path=ppt/slides/slide12.xml><?xml version="1.0" encoding="utf-8"?>
+<p:sld xmlns:a="http://schemas.openxmlformats.org/drawingml/2006/main" xmlns:r="http://schemas.openxmlformats.org/officeDocument/2006/relationships" xmlns:p="http://schemas.openxmlformats.org/presentationml/2006/main">
+  <p:cSld>
+    <p:spTree>
+      <p:nvGrpSpPr>
+        <p:cNvPr id="1" name=""/>
+        <p:cNvGrpSpPr/>
+        <p:nvPr/>
+      </p:nvGrpSpPr>
+      <p:grpSpPr>
+        <a:xfrm>
+          <a:off x="0" y="0"/>
+          <a:ext cx="0" cy="0"/>
+          <a:chOff x="0" y="0"/>
+          <a:chExt cx="0" cy="0"/>
+        </a:xfrm>
+      </p:grpSpPr>
+      <p:sp>
+        <p:nvSpPr>
+          <p:cNvPr id="2" name="Title 1"/>
+          <p:cNvSpPr>
+            <a:spLocks noGrp="1"/>
+          </p:cNvSpPr>
+          <p:nvPr>
+            <p:ph type="title"/>
+          </p:nvPr>
+        </p:nvSpPr>
+        <p:spPr>
+          <a:xfrm>
+            <a:off x="628650" y="1079157"/>
+            <a:ext cx="7886700" cy="853160"/>
+          </a:xfrm>
+        </p:spPr>
+        <p:txBody>
+          <a:bodyPr/>
+          <a:lstStyle/>
+          <a:p>
+            <a:r>
+              <a:rPr lang="en-US" dirty="0" smtClean="0"/>
+              <a:t>Proposed Approach</a:t>
+            </a:r>
+            <a:endParaRPr lang="en-US" dirty="0"/>
+          </a:p>
+        </p:txBody>
+      </p:sp>
+      <p:sp>
+        <p:nvSpPr>
+          <p:cNvPr id="3" name="Content Placeholder 2"/>
+          <p:cNvSpPr>
+            <a:spLocks noGrp="1"/>
+          </p:cNvSpPr>
+          <p:nvPr>
+            <p:ph idx="1"/>
+          </p:nvPr>
+        </p:nvSpPr>
+        <p:spPr>
+          <a:xfrm>
+            <a:off x="628650" y="1916153"/>
+            <a:ext cx="7886700" cy="4792655"/>
+          </a:xfrm>
+        </p:spPr>
+        <p:txBody>
+          <a:bodyPr/>
+          <a:lstStyle/>
+          <a:p>
+            <a:r>
+              <a:rPr lang="en-US" sz="2400" dirty="0" smtClean="0"/>
+              <a:t>Trajectory update is posed an optimal control problem</a:t>
+            </a:r>
+          </a:p>
+          <a:p>
+            <a:pPr lvl="1"/>
+            <a:r>
+              <a:rPr lang="en-US" sz="2000" dirty="0" smtClean="0"/>
+              <a:t>Objective is to minimize distance to original trajectory while satisfying constraints </a:t>
+            </a:r>
+          </a:p>
+          <a:p>
+            <a:r>
+              <a:rPr lang="en-US" sz="2400" dirty="0" smtClean="0"/>
+              <a:t>Use energy as independent variable </a:t>
+            </a:r>
+          </a:p>
+          <a:p>
+            <a:r>
+              <a:rPr lang="en-US" sz="2400" dirty="0" err="1" smtClean="0"/>
+              <a:t>Convexify</a:t>
+            </a:r>
+            <a:r>
+              <a:rPr lang="en-US" sz="2400" dirty="0" smtClean="0"/>
+              <a:t> </a:t>
+            </a:r>
+          </a:p>
+          <a:p>
+            <a:pPr lvl="1"/>
+            <a:r>
+              <a:rPr lang="en-US" sz="2000" dirty="0" smtClean="0"/>
+              <a:t>Treat bank angle as additional state, use bank rate as the control variable</a:t>
+            </a:r>
+          </a:p>
+          <a:p>
+            <a:pPr lvl="1"/>
+            <a:r>
+              <a:rPr lang="en-US" sz="2000" dirty="0" smtClean="0"/>
+              <a:t>Linearize the equations of motion </a:t>
+            </a:r>
+          </a:p>
+          <a:p>
+            <a:pPr lvl="1"/>
+            <a:r>
+              <a:rPr lang="en-US" sz="2000" dirty="0" smtClean="0"/>
+              <a:t>Unlike powered descent case, </a:t>
+            </a:r>
+            <a:r>
+              <a:rPr lang="en-US" sz="2000" dirty="0" err="1" smtClean="0"/>
+              <a:t>convexification</a:t>
+            </a:r>
+            <a:r>
+              <a:rPr lang="en-US" sz="2000" dirty="0" smtClean="0"/>
+              <a:t> is not lossless </a:t>
+            </a:r>
+          </a:p>
+          <a:p>
+            <a:r>
+              <a:rPr lang="en-US" sz="2400" dirty="0" smtClean="0"/>
+              <a:t>Discretize (or transcribe) into second-order cone program</a:t>
+            </a:r>
+          </a:p>
+          <a:p>
+            <a:pPr lvl="1"/>
+            <a:r>
+              <a:rPr lang="en-US" sz="2000" dirty="0" err="1" smtClean="0"/>
+              <a:t>Chebyshev</a:t>
+            </a:r>
+            <a:r>
+              <a:rPr lang="en-US" sz="2000" dirty="0" smtClean="0"/>
+              <a:t> </a:t>
+            </a:r>
+            <a:r>
+              <a:rPr lang="en-US" sz="2000" dirty="0" err="1"/>
+              <a:t>p</a:t>
+            </a:r>
+            <a:r>
+              <a:rPr lang="en-US" sz="2000" dirty="0" err="1" smtClean="0"/>
+              <a:t>seudospectral</a:t>
+            </a:r>
+            <a:r>
+              <a:rPr lang="en-US" sz="2000" dirty="0" smtClean="0"/>
+              <a:t> method </a:t>
+            </a:r>
+          </a:p>
+          <a:p>
+            <a:r>
+              <a:rPr lang="en-US" sz="2400" dirty="0" smtClean="0"/>
+              <a:t>Solve the resulting SOCP using efficient interior-point solver</a:t>
+            </a:r>
+            <a:endParaRPr lang="en-US" sz="2400" dirty="0"/>
+          </a:p>
+        </p:txBody>
+      </p:sp>
+    </p:spTree>
+    <p:extLst>
+      <p:ext uri="{BB962C8B-B14F-4D97-AF65-F5344CB8AC3E}">
+        <p14:creationId xmlns:p14="http://schemas.microsoft.com/office/powerpoint/2010/main" val="3047953510"/>
+      </p:ext>
+    </p:extLst>
+  </p:cSld>
+  <p:clrMapOvr>
+    <a:masterClrMapping/>
+  </p:clrMapOvr>
+</p:sld>
+</file>
+
+<file path=ppt/slides/slide13.xml><?xml version="1.0" encoding="utf-8"?>
+<p:sld xmlns:a="http://schemas.openxmlformats.org/drawingml/2006/main" xmlns:r="http://schemas.openxmlformats.org/officeDocument/2006/relationships" xmlns:p="http://schemas.openxmlformats.org/presentationml/2006/main">
+  <p:cSld>
+    <p:spTree>
+      <p:nvGrpSpPr>
+        <p:cNvPr id="1" name=""/>
+        <p:cNvGrpSpPr/>
+        <p:nvPr/>
+      </p:nvGrpSpPr>
+      <p:grpSpPr>
+        <a:xfrm>
+          <a:off x="0" y="0"/>
+          <a:ext cx="0" cy="0"/>
+          <a:chOff x="0" y="0"/>
+          <a:chExt cx="0" cy="0"/>
+        </a:xfrm>
+      </p:grpSpPr>
+      <p:sp>
+        <p:nvSpPr>
+          <p:cNvPr id="2" name="Title 1"/>
+          <p:cNvSpPr>
+            <a:spLocks noGrp="1"/>
+          </p:cNvSpPr>
+          <p:nvPr>
+            <p:ph type="title"/>
+          </p:nvPr>
+        </p:nvSpPr>
+        <p:spPr/>
+        <p:txBody>
+          <a:bodyPr/>
+          <a:lstStyle/>
+          <a:p>
+            <a:r>
+              <a:rPr lang="en-US" dirty="0" smtClean="0"/>
+              <a:t>Convex Optimization </a:t>
+            </a:r>
+            <a:endParaRPr lang="en-US" dirty="0"/>
+          </a:p>
+        </p:txBody>
+      </p:sp>
+      <p:sp>
+        <p:nvSpPr>
+          <p:cNvPr id="3" name="Content Placeholder 2"/>
+          <p:cNvSpPr>
+            <a:spLocks noGrp="1"/>
+          </p:cNvSpPr>
+          <p:nvPr>
+            <p:ph idx="1"/>
+          </p:nvPr>
+        </p:nvSpPr>
+        <p:spPr/>
+        <p:txBody>
+          <a:bodyPr/>
+          <a:lstStyle/>
+          <a:p>
+            <a:r>
+              <a:rPr lang="en-US" sz="2400" dirty="0" smtClean="0"/>
+              <a:t>(Iterative) Convex optimization approaches to non-convex optimal control problems have exploded in interest due to efficient, polynomial time solvers and guaranteed global solution when the problem is feasible</a:t>
+            </a:r>
+          </a:p>
+          <a:p>
+            <a:r>
+              <a:rPr lang="en-US" sz="2400" dirty="0" smtClean="0"/>
+              <a:t>A variety of aerospace problems have been solved including ascent trajectory design, powered descent trajectory design, interplanetary transfers, and entry</a:t>
+            </a:r>
+          </a:p>
+          <a:p>
+            <a:r>
+              <a:rPr lang="en-US" sz="2400" dirty="0" smtClean="0"/>
+              <a:t>While these convex optimization guarantees solution of feasible sub-problems, not all methods have guaranteed convergence, and those that do typically require an </a:t>
+            </a:r>
+            <a:r>
+              <a:rPr lang="en-US" sz="2400" dirty="0"/>
+              <a:t>unknown number of </a:t>
+            </a:r>
+            <a:r>
+              <a:rPr lang="en-US" sz="2400" dirty="0" smtClean="0"/>
+              <a:t>iterations</a:t>
+            </a:r>
+          </a:p>
+          <a:p>
+            <a:pPr lvl="1"/>
+            <a:r>
+              <a:rPr lang="en-US" sz="2000" dirty="0" smtClean="0"/>
+              <a:t>The proposed approach does not involve multiple iterations</a:t>
+            </a:r>
+            <a:endParaRPr lang="en-US" sz="2000" dirty="0"/>
+          </a:p>
+          <a:p>
+            <a:endParaRPr lang="en-US" dirty="0"/>
+          </a:p>
+        </p:txBody>
+      </p:sp>
+    </p:spTree>
+    <p:extLst>
+      <p:ext uri="{BB962C8B-B14F-4D97-AF65-F5344CB8AC3E}">
+        <p14:creationId xmlns:p14="http://schemas.microsoft.com/office/powerpoint/2010/main" val="3747838991"/>
+      </p:ext>
+    </p:extLst>
+  </p:cSld>
+  <p:clrMapOvr>
+    <a:masterClrMapping/>
+  </p:clrMapOvr>
+</p:sld>
+</file>
+
+<file path=ppt/slides/slide14.xml><?xml version="1.0" encoding="utf-8"?>
+<p:sld xmlns:a="http://schemas.openxmlformats.org/drawingml/2006/main" xmlns:r="http://schemas.openxmlformats.org/officeDocument/2006/relationships" xmlns:p="http://schemas.openxmlformats.org/presentationml/2006/main">
+  <p:cSld>
+    <p:spTree>
+      <p:nvGrpSpPr>
+        <p:cNvPr id="1" name=""/>
+        <p:cNvGrpSpPr/>
+        <p:nvPr/>
+      </p:nvGrpSpPr>
+      <p:grpSpPr>
+        <a:xfrm>
+          <a:off x="0" y="0"/>
+          <a:ext cx="0" cy="0"/>
+          <a:chOff x="0" y="0"/>
+          <a:chExt cx="0" cy="0"/>
+        </a:xfrm>
+      </p:grpSpPr>
       <p:pic>
         <p:nvPicPr>
           <p:cNvPr id="15" name="Picture 14"/>
@@ -4794,7 +5302,7 @@
 </p:sld>
 </file>
 
-<file path=ppt/slides/slide11.xml><?xml version="1.0" encoding="utf-8"?>
+<file path=ppt/slides/slide15.xml><?xml version="1.0" encoding="utf-8"?>
 <p:sld xmlns:a="http://schemas.openxmlformats.org/drawingml/2006/main" xmlns:r="http://schemas.openxmlformats.org/officeDocument/2006/relationships" xmlns:p="http://schemas.openxmlformats.org/presentationml/2006/main">
   <p:cSld>
     <p:spTree>
@@ -4971,664 +5479,6 @@
     <p:extLst>
       <p:ext uri="{BB962C8B-B14F-4D97-AF65-F5344CB8AC3E}">
         <p14:creationId xmlns:p14="http://schemas.microsoft.com/office/powerpoint/2010/main" val="860064350"/>
-      </p:ext>
-    </p:extLst>
-  </p:cSld>
-  <p:clrMapOvr>
-    <a:masterClrMapping/>
-  </p:clrMapOvr>
-</p:sld>
-</file>
-
-<file path=ppt/slides/slide12.xml><?xml version="1.0" encoding="utf-8"?>
-<p:sld xmlns:a="http://schemas.openxmlformats.org/drawingml/2006/main" xmlns:r="http://schemas.openxmlformats.org/officeDocument/2006/relationships" xmlns:p="http://schemas.openxmlformats.org/presentationml/2006/main">
-  <p:cSld>
-    <p:spTree>
-      <p:nvGrpSpPr>
-        <p:cNvPr id="1" name=""/>
-        <p:cNvGrpSpPr/>
-        <p:nvPr/>
-      </p:nvGrpSpPr>
-      <p:grpSpPr>
-        <a:xfrm>
-          <a:off x="0" y="0"/>
-          <a:ext cx="0" cy="0"/>
-          <a:chOff x="0" y="0"/>
-          <a:chExt cx="0" cy="0"/>
-        </a:xfrm>
-      </p:grpSpPr>
-      <p:sp>
-        <p:nvSpPr>
-          <p:cNvPr id="2" name="Title 1"/>
-          <p:cNvSpPr>
-            <a:spLocks noGrp="1"/>
-          </p:cNvSpPr>
-          <p:nvPr>
-            <p:ph type="title"/>
-          </p:nvPr>
-        </p:nvSpPr>
-        <p:spPr/>
-        <p:txBody>
-          <a:bodyPr/>
-          <a:lstStyle/>
-          <a:p>
-            <a:r>
-              <a:rPr lang="en-US" dirty="0" smtClean="0"/>
-              <a:t>Monte Carlo Simulation</a:t>
-            </a:r>
-            <a:endParaRPr lang="en-US" dirty="0"/>
-          </a:p>
-        </p:txBody>
-      </p:sp>
-      <p:sp>
-        <p:nvSpPr>
-          <p:cNvPr id="3" name="Content Placeholder 2"/>
-          <p:cNvSpPr>
-            <a:spLocks noGrp="1"/>
-          </p:cNvSpPr>
-          <p:nvPr>
-            <p:ph idx="1"/>
-          </p:nvPr>
-        </p:nvSpPr>
-        <p:spPr/>
-        <p:txBody>
-          <a:bodyPr/>
-          <a:lstStyle/>
-          <a:p>
-            <a:r>
-              <a:rPr lang="en-US" sz="2400" dirty="0" smtClean="0"/>
-              <a:t>Vehicle is nominally L/D = 0.24 with initial state subject to MSL-like dispersions</a:t>
-            </a:r>
-            <a:endParaRPr lang="en-US" sz="2400" dirty="0"/>
-          </a:p>
-          <a:p>
-            <a:r>
-              <a:rPr lang="en-US" sz="2400" dirty="0" err="1" smtClean="0"/>
-              <a:t>MarsGRAM</a:t>
-            </a:r>
-            <a:r>
-              <a:rPr lang="en-US" sz="2400" dirty="0" smtClean="0"/>
-              <a:t> is used for environment modeling</a:t>
-            </a:r>
-          </a:p>
-          <a:p>
-            <a:r>
-              <a:rPr lang="en-US" sz="2400" dirty="0" smtClean="0"/>
-              <a:t>Uncertainty is added to lift and drag coefficients</a:t>
-            </a:r>
-          </a:p>
-          <a:p>
-            <a:pPr lvl="1"/>
-            <a:r>
-              <a:rPr lang="en-US" sz="2000" dirty="0" smtClean="0"/>
-              <a:t>Gaussian with 3</a:t>
-            </a:r>
-            <a:r>
-              <a:rPr lang="el-GR" sz="2000" dirty="0" smtClean="0"/>
-              <a:t>σ</a:t>
-            </a:r>
-            <a:r>
-              <a:rPr lang="en-US" sz="2000" dirty="0" smtClean="0"/>
-              <a:t> = 10%</a:t>
-            </a:r>
-          </a:p>
-          <a:p>
-            <a:r>
-              <a:rPr lang="en-US" sz="2400" dirty="0" smtClean="0"/>
-              <a:t>Updates occurs at 10 second intervals and stops at 600 m/s </a:t>
-            </a:r>
-          </a:p>
-          <a:p>
-            <a:r>
-              <a:rPr lang="en-US" sz="2400" dirty="0" smtClean="0"/>
-              <a:t>Bank angle limited to ±90°, and bank rate limited to 20°/s</a:t>
-            </a:r>
-          </a:p>
-          <a:p>
-            <a:r>
-              <a:rPr lang="en-US" sz="2400" dirty="0" smtClean="0"/>
-              <a:t>200 samples chosen by </a:t>
-            </a:r>
-            <a:r>
-              <a:rPr lang="en-US" sz="2400" dirty="0" err="1" smtClean="0"/>
-              <a:t>Sobol</a:t>
-            </a:r>
-            <a:r>
-              <a:rPr lang="en-US" sz="2400" dirty="0" smtClean="0"/>
-              <a:t>’ sequence</a:t>
-            </a:r>
-          </a:p>
-          <a:p>
-            <a:r>
-              <a:rPr lang="en-US" sz="2400" dirty="0" smtClean="0"/>
-              <a:t>Trajectories terminate when they reach the correct downrange distance</a:t>
-            </a:r>
-          </a:p>
-          <a:p>
-            <a:pPr lvl="1"/>
-            <a:r>
-              <a:rPr lang="en-US" sz="2000" dirty="0" smtClean="0"/>
-              <a:t>Simple logic, but should expect variations in final altitude and velocity despite energy as independent variable  </a:t>
-            </a:r>
-          </a:p>
-        </p:txBody>
-      </p:sp>
-    </p:spTree>
-    <p:extLst>
-      <p:ext uri="{BB962C8B-B14F-4D97-AF65-F5344CB8AC3E}">
-        <p14:creationId xmlns:p14="http://schemas.microsoft.com/office/powerpoint/2010/main" val="3505934654"/>
-      </p:ext>
-    </p:extLst>
-  </p:cSld>
-  <p:clrMapOvr>
-    <a:masterClrMapping/>
-  </p:clrMapOvr>
-</p:sld>
-</file>
-
-<file path=ppt/slides/slide13.xml><?xml version="1.0" encoding="utf-8"?>
-<p:sld xmlns:a="http://schemas.openxmlformats.org/drawingml/2006/main" xmlns:r="http://schemas.openxmlformats.org/officeDocument/2006/relationships" xmlns:p="http://schemas.openxmlformats.org/presentationml/2006/main">
-  <p:cSld>
-    <p:spTree>
-      <p:nvGrpSpPr>
-        <p:cNvPr id="1" name=""/>
-        <p:cNvGrpSpPr/>
-        <p:nvPr/>
-      </p:nvGrpSpPr>
-      <p:grpSpPr>
-        <a:xfrm>
-          <a:off x="0" y="0"/>
-          <a:ext cx="0" cy="0"/>
-          <a:chOff x="0" y="0"/>
-          <a:chExt cx="0" cy="0"/>
-        </a:xfrm>
-      </p:grpSpPr>
-      <p:sp>
-        <p:nvSpPr>
-          <p:cNvPr id="2" name="Title 1"/>
-          <p:cNvSpPr>
-            <a:spLocks noGrp="1"/>
-          </p:cNvSpPr>
-          <p:nvPr>
-            <p:ph type="title"/>
-          </p:nvPr>
-        </p:nvSpPr>
-        <p:spPr/>
-        <p:txBody>
-          <a:bodyPr/>
-          <a:lstStyle/>
-          <a:p>
-            <a:r>
-              <a:rPr lang="en-US" dirty="0" smtClean="0"/>
-              <a:t>MCS Results - </a:t>
-            </a:r>
-            <a:r>
-              <a:rPr lang="en-US" dirty="0" err="1" smtClean="0"/>
-              <a:t>Groundtrack</a:t>
-            </a:r>
-            <a:endParaRPr lang="en-US" dirty="0"/>
-          </a:p>
-        </p:txBody>
-      </p:sp>
-      <p:sp>
-        <p:nvSpPr>
-          <p:cNvPr id="3" name="Content Placeholder 2"/>
-          <p:cNvSpPr>
-            <a:spLocks noGrp="1"/>
-          </p:cNvSpPr>
-          <p:nvPr>
-            <p:ph idx="1"/>
-          </p:nvPr>
-        </p:nvSpPr>
-        <p:spPr>
-          <a:xfrm>
-            <a:off x="628650" y="1777500"/>
-            <a:ext cx="7886700" cy="1398838"/>
-          </a:xfrm>
-        </p:spPr>
-        <p:txBody>
-          <a:bodyPr/>
-          <a:lstStyle/>
-          <a:p>
-            <a:r>
-              <a:rPr lang="en-US" sz="2400" dirty="0" smtClean="0"/>
-              <a:t>Excellent </a:t>
-            </a:r>
-            <a:r>
-              <a:rPr lang="en-US" sz="2400" dirty="0" err="1" smtClean="0"/>
-              <a:t>crossrange</a:t>
-            </a:r>
-            <a:r>
-              <a:rPr lang="en-US" sz="2400" dirty="0" smtClean="0"/>
-              <a:t> performance due to coupled update to longitudinal and lateral channels </a:t>
-            </a:r>
-          </a:p>
-          <a:p>
-            <a:r>
-              <a:rPr lang="en-US" sz="2400" dirty="0" smtClean="0"/>
-              <a:t>Interestingly, a small number of samples even have an additional reversal</a:t>
-            </a:r>
-            <a:endParaRPr lang="en-US" sz="2400" dirty="0"/>
-          </a:p>
-        </p:txBody>
-      </p:sp>
-      <p:pic>
-        <p:nvPicPr>
-          <p:cNvPr id="5" name="Picture 4"/>
-          <p:cNvPicPr>
-            <a:picLocks noChangeAspect="1"/>
-          </p:cNvPicPr>
-          <p:nvPr/>
-        </p:nvPicPr>
-        <p:blipFill>
-          <a:blip r:embed="rId3">
-            <a:extLst>
-              <a:ext uri="{28A0092B-C50C-407E-A947-70E740481C1C}">
-                <a14:useLocalDpi xmlns:a14="http://schemas.microsoft.com/office/drawing/2010/main" val="0"/>
-              </a:ext>
-            </a:extLst>
-          </a:blip>
-          <a:stretch>
-            <a:fillRect/>
-          </a:stretch>
-        </p:blipFill>
-        <p:spPr>
-          <a:xfrm>
-            <a:off x="1600247" y="3272588"/>
-            <a:ext cx="5750999" cy="3498601"/>
-          </a:xfrm>
-          <a:prstGeom prst="rect">
-            <a:avLst/>
-          </a:prstGeom>
-        </p:spPr>
-      </p:pic>
-    </p:spTree>
-    <p:extLst>
-      <p:ext uri="{BB962C8B-B14F-4D97-AF65-F5344CB8AC3E}">
-        <p14:creationId xmlns:p14="http://schemas.microsoft.com/office/powerpoint/2010/main" val="1826672569"/>
-      </p:ext>
-    </p:extLst>
-  </p:cSld>
-  <p:clrMapOvr>
-    <a:masterClrMapping/>
-  </p:clrMapOvr>
-</p:sld>
-</file>
-
-<file path=ppt/slides/slide14.xml><?xml version="1.0" encoding="utf-8"?>
-<p:sld xmlns:a="http://schemas.openxmlformats.org/drawingml/2006/main" xmlns:r="http://schemas.openxmlformats.org/officeDocument/2006/relationships" xmlns:p="http://schemas.openxmlformats.org/presentationml/2006/main">
-  <p:cSld>
-    <p:spTree>
-      <p:nvGrpSpPr>
-        <p:cNvPr id="1" name=""/>
-        <p:cNvGrpSpPr/>
-        <p:nvPr/>
-      </p:nvGrpSpPr>
-      <p:grpSpPr>
-        <a:xfrm>
-          <a:off x="0" y="0"/>
-          <a:ext cx="0" cy="0"/>
-          <a:chOff x="0" y="0"/>
-          <a:chExt cx="0" cy="0"/>
-        </a:xfrm>
-      </p:grpSpPr>
-      <p:sp>
-        <p:nvSpPr>
-          <p:cNvPr id="2" name="Title 1"/>
-          <p:cNvSpPr>
-            <a:spLocks noGrp="1"/>
-          </p:cNvSpPr>
-          <p:nvPr>
-            <p:ph type="title"/>
-          </p:nvPr>
-        </p:nvSpPr>
-        <p:spPr>
-          <a:xfrm>
-            <a:off x="628649" y="964938"/>
-            <a:ext cx="8370972" cy="611532"/>
-          </a:xfrm>
-        </p:spPr>
-        <p:txBody>
-          <a:bodyPr/>
-          <a:lstStyle/>
-          <a:p>
-            <a:r>
-              <a:rPr lang="en-US" dirty="0" smtClean="0"/>
-              <a:t>MCS Results – Altitude/Velocity</a:t>
-            </a:r>
-            <a:endParaRPr lang="en-US" dirty="0"/>
-          </a:p>
-        </p:txBody>
-      </p:sp>
-      <p:sp>
-        <p:nvSpPr>
-          <p:cNvPr id="3" name="Content Placeholder 2"/>
-          <p:cNvSpPr>
-            <a:spLocks noGrp="1"/>
-          </p:cNvSpPr>
-          <p:nvPr>
-            <p:ph idx="1"/>
-          </p:nvPr>
-        </p:nvSpPr>
-        <p:spPr>
-          <a:xfrm>
-            <a:off x="628649" y="1690690"/>
-            <a:ext cx="7886700" cy="1437522"/>
-          </a:xfrm>
-        </p:spPr>
-        <p:txBody>
-          <a:bodyPr/>
-          <a:lstStyle/>
-          <a:p>
-            <a:r>
-              <a:rPr lang="en-US" sz="2400" dirty="0" smtClean="0"/>
-              <a:t>Although some trajectories exit the parachute deployment conditions, all but three pass through the box</a:t>
-            </a:r>
-          </a:p>
-          <a:p>
-            <a:pPr lvl="1"/>
-            <a:r>
-              <a:rPr lang="en-US" sz="2000" dirty="0" smtClean="0"/>
-              <a:t>Solved by considering triggering logic that explicitly accounts for parachute conditions </a:t>
-            </a:r>
-          </a:p>
-          <a:p>
-            <a:pPr marL="0" indent="0">
-              <a:buNone/>
-            </a:pPr>
-            <a:endParaRPr lang="en-US" dirty="0"/>
-          </a:p>
-        </p:txBody>
-      </p:sp>
-      <p:pic>
-        <p:nvPicPr>
-          <p:cNvPr id="7" name="Picture 6"/>
-          <p:cNvPicPr>
-            <a:picLocks noChangeAspect="1"/>
-          </p:cNvPicPr>
-          <p:nvPr/>
-        </p:nvPicPr>
-        <p:blipFill>
-          <a:blip r:embed="rId2">
-            <a:extLst>
-              <a:ext uri="{28A0092B-C50C-407E-A947-70E740481C1C}">
-                <a14:useLocalDpi xmlns:a14="http://schemas.microsoft.com/office/drawing/2010/main" val="0"/>
-              </a:ext>
-            </a:extLst>
-          </a:blip>
-          <a:stretch>
-            <a:fillRect/>
-          </a:stretch>
-        </p:blipFill>
-        <p:spPr>
-          <a:xfrm>
-            <a:off x="6015308" y="3001647"/>
-            <a:ext cx="2984313" cy="1856906"/>
-          </a:xfrm>
-          <a:prstGeom prst="rect">
-            <a:avLst/>
-          </a:prstGeom>
-        </p:spPr>
-      </p:pic>
-      <p:pic>
-        <p:nvPicPr>
-          <p:cNvPr id="8" name="Picture 7"/>
-          <p:cNvPicPr>
-            <a:picLocks noChangeAspect="1"/>
-          </p:cNvPicPr>
-          <p:nvPr/>
-        </p:nvPicPr>
-        <p:blipFill>
-          <a:blip r:embed="rId3">
-            <a:extLst>
-              <a:ext uri="{28A0092B-C50C-407E-A947-70E740481C1C}">
-                <a14:useLocalDpi xmlns:a14="http://schemas.microsoft.com/office/drawing/2010/main" val="0"/>
-              </a:ext>
-            </a:extLst>
-          </a:blip>
-          <a:stretch>
-            <a:fillRect/>
-          </a:stretch>
-        </p:blipFill>
-        <p:spPr>
-          <a:xfrm>
-            <a:off x="6015308" y="4858553"/>
-            <a:ext cx="2984313" cy="1856905"/>
-          </a:xfrm>
-          <a:prstGeom prst="rect">
-            <a:avLst/>
-          </a:prstGeom>
-        </p:spPr>
-      </p:pic>
-      <p:pic>
-        <p:nvPicPr>
-          <p:cNvPr id="9" name="Picture 8"/>
-          <p:cNvPicPr>
-            <a:picLocks noChangeAspect="1"/>
-          </p:cNvPicPr>
-          <p:nvPr/>
-        </p:nvPicPr>
-        <p:blipFill>
-          <a:blip r:embed="rId4">
-            <a:extLst>
-              <a:ext uri="{28A0092B-C50C-407E-A947-70E740481C1C}">
-                <a14:useLocalDpi xmlns:a14="http://schemas.microsoft.com/office/drawing/2010/main" val="0"/>
-              </a:ext>
-            </a:extLst>
-          </a:blip>
-          <a:stretch>
-            <a:fillRect/>
-          </a:stretch>
-        </p:blipFill>
-        <p:spPr>
-          <a:xfrm>
-            <a:off x="198640" y="3128212"/>
-            <a:ext cx="5332396" cy="3273687"/>
-          </a:xfrm>
-          <a:prstGeom prst="rect">
-            <a:avLst/>
-          </a:prstGeom>
-        </p:spPr>
-      </p:pic>
-    </p:spTree>
-    <p:extLst>
-      <p:ext uri="{BB962C8B-B14F-4D97-AF65-F5344CB8AC3E}">
-        <p14:creationId xmlns:p14="http://schemas.microsoft.com/office/powerpoint/2010/main" val="303004292"/>
-      </p:ext>
-    </p:extLst>
-  </p:cSld>
-  <p:clrMapOvr>
-    <a:masterClrMapping/>
-  </p:clrMapOvr>
-</p:sld>
-</file>
-
-<file path=ppt/slides/slide15.xml><?xml version="1.0" encoding="utf-8"?>
-<p:sld xmlns:a="http://schemas.openxmlformats.org/drawingml/2006/main" xmlns:r="http://schemas.openxmlformats.org/officeDocument/2006/relationships" xmlns:p="http://schemas.openxmlformats.org/presentationml/2006/main">
-  <p:cSld>
-    <p:spTree>
-      <p:nvGrpSpPr>
-        <p:cNvPr id="1" name=""/>
-        <p:cNvGrpSpPr/>
-        <p:nvPr/>
-      </p:nvGrpSpPr>
-      <p:grpSpPr>
-        <a:xfrm>
-          <a:off x="0" y="0"/>
-          <a:ext cx="0" cy="0"/>
-          <a:chOff x="0" y="0"/>
-          <a:chExt cx="0" cy="0"/>
-        </a:xfrm>
-      </p:grpSpPr>
-      <p:sp>
-        <p:nvSpPr>
-          <p:cNvPr id="2" name="Title 1"/>
-          <p:cNvSpPr>
-            <a:spLocks noGrp="1"/>
-          </p:cNvSpPr>
-          <p:nvPr>
-            <p:ph type="title"/>
-          </p:nvPr>
-        </p:nvSpPr>
-        <p:spPr/>
-        <p:txBody>
-          <a:bodyPr/>
-          <a:lstStyle/>
-          <a:p>
-            <a:r>
-              <a:rPr lang="en-US" dirty="0" smtClean="0"/>
-              <a:t>MCS Results – Bank Profiles </a:t>
-            </a:r>
-            <a:endParaRPr lang="en-US" dirty="0"/>
-          </a:p>
-        </p:txBody>
-      </p:sp>
-      <p:sp>
-        <p:nvSpPr>
-          <p:cNvPr id="5" name="Content Placeholder 4"/>
-          <p:cNvSpPr>
-            <a:spLocks noGrp="1"/>
-          </p:cNvSpPr>
-          <p:nvPr>
-            <p:ph idx="1"/>
-          </p:nvPr>
-        </p:nvSpPr>
-        <p:spPr>
-          <a:xfrm>
-            <a:off x="628650" y="1825625"/>
-            <a:ext cx="8245843" cy="1244834"/>
-          </a:xfrm>
-        </p:spPr>
-        <p:txBody>
-          <a:bodyPr/>
-          <a:lstStyle/>
-          <a:p>
-            <a:r>
-              <a:rPr lang="en-US" dirty="0" smtClean="0"/>
-              <a:t>Largest difference is in the timing of bank reversals</a:t>
-            </a:r>
-          </a:p>
-          <a:p>
-            <a:pPr lvl="0"/>
-            <a:r>
-              <a:rPr lang="en-US" dirty="0">
-                <a:solidFill>
-                  <a:prstClr val="black"/>
-                </a:solidFill>
-              </a:rPr>
-              <a:t>Bank angle (and trajectory in general) deviates from the original trajectory most at the end</a:t>
-            </a:r>
-          </a:p>
-          <a:p>
-            <a:endParaRPr lang="en-US" dirty="0" smtClean="0"/>
-          </a:p>
-          <a:p>
-            <a:endParaRPr lang="en-US" dirty="0"/>
-          </a:p>
-        </p:txBody>
-      </p:sp>
-      <p:pic>
-        <p:nvPicPr>
-          <p:cNvPr id="6" name="Picture 5"/>
-          <p:cNvPicPr>
-            <a:picLocks noChangeAspect="1"/>
-          </p:cNvPicPr>
-          <p:nvPr/>
-        </p:nvPicPr>
-        <p:blipFill>
-          <a:blip r:embed="rId2">
-            <a:extLst>
-              <a:ext uri="{28A0092B-C50C-407E-A947-70E740481C1C}">
-                <a14:useLocalDpi xmlns:a14="http://schemas.microsoft.com/office/drawing/2010/main" val="0"/>
-              </a:ext>
-            </a:extLst>
-          </a:blip>
-          <a:stretch>
-            <a:fillRect/>
-          </a:stretch>
-        </p:blipFill>
-        <p:spPr>
-          <a:xfrm>
-            <a:off x="259880" y="3197993"/>
-            <a:ext cx="5813843" cy="3488306"/>
-          </a:xfrm>
-          <a:prstGeom prst="rect">
-            <a:avLst/>
-          </a:prstGeom>
-        </p:spPr>
-      </p:pic>
-      <p:sp>
-        <p:nvSpPr>
-          <p:cNvPr id="7" name="TextBox 6"/>
-          <p:cNvSpPr txBox="1"/>
-          <p:nvPr/>
-        </p:nvSpPr>
-        <p:spPr>
-          <a:xfrm>
-            <a:off x="5861784" y="3395901"/>
-            <a:ext cx="3205214" cy="2363724"/>
-          </a:xfrm>
-          <a:prstGeom prst="rect">
-            <a:avLst/>
-          </a:prstGeom>
-          <a:noFill/>
-        </p:spPr>
-        <p:txBody>
-          <a:bodyPr wrap="square" rtlCol="0">
-            <a:spAutoFit/>
-          </a:bodyPr>
-          <a:lstStyle/>
-          <a:p>
-            <a:pPr lvl="1">
-              <a:lnSpc>
-                <a:spcPct val="90000"/>
-              </a:lnSpc>
-              <a:spcBef>
-                <a:spcPts val="500"/>
-              </a:spcBef>
-            </a:pPr>
-            <a:r>
-              <a:rPr lang="en-US" sz="2400" dirty="0" smtClean="0">
-                <a:solidFill>
-                  <a:prstClr val="black"/>
-                </a:solidFill>
-              </a:rPr>
-              <a:t>This </a:t>
-            </a:r>
-            <a:r>
-              <a:rPr lang="en-US" sz="2400" dirty="0">
-                <a:solidFill>
-                  <a:prstClr val="black"/>
-                </a:solidFill>
-              </a:rPr>
-              <a:t>is expected because </a:t>
-            </a:r>
-            <a:r>
-              <a:rPr lang="en-US" sz="2400" dirty="0" smtClean="0">
-                <a:solidFill>
-                  <a:prstClr val="black"/>
-                </a:solidFill>
-              </a:rPr>
-              <a:t>the later portion of trajectory is updated the greatest number </a:t>
-            </a:r>
-            <a:r>
-              <a:rPr lang="en-US" sz="2400" dirty="0">
-                <a:solidFill>
-                  <a:prstClr val="black"/>
-                </a:solidFill>
-              </a:rPr>
-              <a:t>of times </a:t>
-            </a:r>
-          </a:p>
-          <a:p>
-            <a:endParaRPr lang="en-US" dirty="0"/>
-          </a:p>
-        </p:txBody>
-      </p:sp>
-    </p:spTree>
-    <p:extLst>
-      <p:ext uri="{BB962C8B-B14F-4D97-AF65-F5344CB8AC3E}">
-        <p14:creationId xmlns:p14="http://schemas.microsoft.com/office/powerpoint/2010/main" val="1145173546"/>
       </p:ext>
     </p:extLst>
   </p:cSld>
@@ -5672,6 +5522,792 @@
           <a:p>
             <a:r>
               <a:rPr lang="en-US" dirty="0" smtClean="0"/>
+              <a:t>Monte Carlo Simulation</a:t>
+            </a:r>
+            <a:endParaRPr lang="en-US" dirty="0"/>
+          </a:p>
+        </p:txBody>
+      </p:sp>
+      <p:sp>
+        <p:nvSpPr>
+          <p:cNvPr id="3" name="Content Placeholder 2"/>
+          <p:cNvSpPr>
+            <a:spLocks noGrp="1"/>
+          </p:cNvSpPr>
+          <p:nvPr>
+            <p:ph idx="1"/>
+          </p:nvPr>
+        </p:nvSpPr>
+        <p:spPr/>
+        <p:txBody>
+          <a:bodyPr/>
+          <a:lstStyle/>
+          <a:p>
+            <a:r>
+              <a:rPr lang="en-US" sz="2400" dirty="0" smtClean="0"/>
+              <a:t>Vehicle is nominally L/D = 0.24 with initial state subject to MSL-like dispersions</a:t>
+            </a:r>
+            <a:endParaRPr lang="en-US" sz="2400" dirty="0"/>
+          </a:p>
+          <a:p>
+            <a:r>
+              <a:rPr lang="en-US" sz="2400" dirty="0" err="1" smtClean="0"/>
+              <a:t>MarsGRAM</a:t>
+            </a:r>
+            <a:r>
+              <a:rPr lang="en-US" sz="2400" dirty="0" smtClean="0"/>
+              <a:t> is used for environment modeling</a:t>
+            </a:r>
+          </a:p>
+          <a:p>
+            <a:r>
+              <a:rPr lang="en-US" sz="2400" dirty="0" smtClean="0"/>
+              <a:t>Uncertainty is added to lift and drag coefficients</a:t>
+            </a:r>
+          </a:p>
+          <a:p>
+            <a:pPr lvl="1"/>
+            <a:r>
+              <a:rPr lang="en-US" sz="2000" dirty="0" smtClean="0"/>
+              <a:t>Gaussian with 3</a:t>
+            </a:r>
+            <a:r>
+              <a:rPr lang="el-GR" sz="2000" dirty="0" smtClean="0"/>
+              <a:t>σ</a:t>
+            </a:r>
+            <a:r>
+              <a:rPr lang="en-US" sz="2000" dirty="0" smtClean="0"/>
+              <a:t> = 10%</a:t>
+            </a:r>
+          </a:p>
+          <a:p>
+            <a:r>
+              <a:rPr lang="en-US" sz="2400" dirty="0" smtClean="0"/>
+              <a:t>Updates occurs at 10 second intervals and stops at 600 m/s </a:t>
+            </a:r>
+          </a:p>
+          <a:p>
+            <a:r>
+              <a:rPr lang="en-US" sz="2400" dirty="0" smtClean="0"/>
+              <a:t>Bank angle limited to ±90°, and bank rate limited to 20°/s</a:t>
+            </a:r>
+          </a:p>
+          <a:p>
+            <a:r>
+              <a:rPr lang="en-US" sz="2400" dirty="0" smtClean="0"/>
+              <a:t>200 samples chosen by </a:t>
+            </a:r>
+            <a:r>
+              <a:rPr lang="en-US" sz="2400" dirty="0" err="1" smtClean="0"/>
+              <a:t>Sobol</a:t>
+            </a:r>
+            <a:r>
+              <a:rPr lang="en-US" sz="2400" dirty="0" smtClean="0"/>
+              <a:t>’ sequence</a:t>
+            </a:r>
+          </a:p>
+          <a:p>
+            <a:r>
+              <a:rPr lang="en-US" sz="2400" dirty="0" smtClean="0"/>
+              <a:t>Trajectories terminate when they reach the correct downrange distance</a:t>
+            </a:r>
+          </a:p>
+          <a:p>
+            <a:pPr lvl="1"/>
+            <a:r>
+              <a:rPr lang="en-US" sz="2000" dirty="0" smtClean="0"/>
+              <a:t>Simple logic, but should expect variations in final altitude and velocity despite energy as independent variable  </a:t>
+            </a:r>
+          </a:p>
+        </p:txBody>
+      </p:sp>
+    </p:spTree>
+    <p:extLst>
+      <p:ext uri="{BB962C8B-B14F-4D97-AF65-F5344CB8AC3E}">
+        <p14:creationId xmlns:p14="http://schemas.microsoft.com/office/powerpoint/2010/main" val="3505934654"/>
+      </p:ext>
+    </p:extLst>
+  </p:cSld>
+  <p:clrMapOvr>
+    <a:masterClrMapping/>
+  </p:clrMapOvr>
+</p:sld>
+</file>
+
+<file path=ppt/slides/slide17.xml><?xml version="1.0" encoding="utf-8"?>
+<p:sld xmlns:a="http://schemas.openxmlformats.org/drawingml/2006/main" xmlns:r="http://schemas.openxmlformats.org/officeDocument/2006/relationships" xmlns:p="http://schemas.openxmlformats.org/presentationml/2006/main">
+  <p:cSld>
+    <p:spTree>
+      <p:nvGrpSpPr>
+        <p:cNvPr id="1" name=""/>
+        <p:cNvGrpSpPr/>
+        <p:nvPr/>
+      </p:nvGrpSpPr>
+      <p:grpSpPr>
+        <a:xfrm>
+          <a:off x="0" y="0"/>
+          <a:ext cx="0" cy="0"/>
+          <a:chOff x="0" y="0"/>
+          <a:chExt cx="0" cy="0"/>
+        </a:xfrm>
+      </p:grpSpPr>
+      <p:sp>
+        <p:nvSpPr>
+          <p:cNvPr id="2" name="Title 1"/>
+          <p:cNvSpPr>
+            <a:spLocks noGrp="1"/>
+          </p:cNvSpPr>
+          <p:nvPr>
+            <p:ph type="title"/>
+          </p:nvPr>
+        </p:nvSpPr>
+        <p:spPr/>
+        <p:txBody>
+          <a:bodyPr/>
+          <a:lstStyle/>
+          <a:p>
+            <a:r>
+              <a:rPr lang="en-US" dirty="0" smtClean="0"/>
+              <a:t>MCS Results - </a:t>
+            </a:r>
+            <a:r>
+              <a:rPr lang="en-US" dirty="0" err="1" smtClean="0"/>
+              <a:t>Groundtrack</a:t>
+            </a:r>
+            <a:endParaRPr lang="en-US" dirty="0"/>
+          </a:p>
+        </p:txBody>
+      </p:sp>
+      <p:sp>
+        <p:nvSpPr>
+          <p:cNvPr id="3" name="Content Placeholder 2"/>
+          <p:cNvSpPr>
+            <a:spLocks noGrp="1"/>
+          </p:cNvSpPr>
+          <p:nvPr>
+            <p:ph idx="1"/>
+          </p:nvPr>
+        </p:nvSpPr>
+        <p:spPr>
+          <a:xfrm>
+            <a:off x="628650" y="1777500"/>
+            <a:ext cx="7886700" cy="1398838"/>
+          </a:xfrm>
+        </p:spPr>
+        <p:txBody>
+          <a:bodyPr/>
+          <a:lstStyle/>
+          <a:p>
+            <a:r>
+              <a:rPr lang="en-US" sz="2400" dirty="0" smtClean="0"/>
+              <a:t>Excellent </a:t>
+            </a:r>
+            <a:r>
+              <a:rPr lang="en-US" sz="2400" dirty="0" err="1" smtClean="0"/>
+              <a:t>crossrange</a:t>
+            </a:r>
+            <a:r>
+              <a:rPr lang="en-US" sz="2400" dirty="0" smtClean="0"/>
+              <a:t> performance due to coupled update to longitudinal and lateral channels </a:t>
+            </a:r>
+          </a:p>
+          <a:p>
+            <a:r>
+              <a:rPr lang="en-US" sz="2400" dirty="0" smtClean="0"/>
+              <a:t>Interestingly, a small number of samples even have an additional reversal</a:t>
+            </a:r>
+            <a:endParaRPr lang="en-US" sz="2400" dirty="0"/>
+          </a:p>
+        </p:txBody>
+      </p:sp>
+      <p:pic>
+        <p:nvPicPr>
+          <p:cNvPr id="5" name="Picture 4"/>
+          <p:cNvPicPr>
+            <a:picLocks noChangeAspect="1"/>
+          </p:cNvPicPr>
+          <p:nvPr/>
+        </p:nvPicPr>
+        <p:blipFill>
+          <a:blip r:embed="rId3">
+            <a:extLst>
+              <a:ext uri="{28A0092B-C50C-407E-A947-70E740481C1C}">
+                <a14:useLocalDpi xmlns:a14="http://schemas.microsoft.com/office/drawing/2010/main" val="0"/>
+              </a:ext>
+            </a:extLst>
+          </a:blip>
+          <a:stretch>
+            <a:fillRect/>
+          </a:stretch>
+        </p:blipFill>
+        <p:spPr>
+          <a:xfrm>
+            <a:off x="1600247" y="3272588"/>
+            <a:ext cx="5750999" cy="3498601"/>
+          </a:xfrm>
+          <a:prstGeom prst="rect">
+            <a:avLst/>
+          </a:prstGeom>
+        </p:spPr>
+      </p:pic>
+    </p:spTree>
+    <p:extLst>
+      <p:ext uri="{BB962C8B-B14F-4D97-AF65-F5344CB8AC3E}">
+        <p14:creationId xmlns:p14="http://schemas.microsoft.com/office/powerpoint/2010/main" val="1826672569"/>
+      </p:ext>
+    </p:extLst>
+  </p:cSld>
+  <p:clrMapOvr>
+    <a:masterClrMapping/>
+  </p:clrMapOvr>
+</p:sld>
+</file>
+
+<file path=ppt/slides/slide18.xml><?xml version="1.0" encoding="utf-8"?>
+<p:sld xmlns:a="http://schemas.openxmlformats.org/drawingml/2006/main" xmlns:r="http://schemas.openxmlformats.org/officeDocument/2006/relationships" xmlns:p="http://schemas.openxmlformats.org/presentationml/2006/main">
+  <p:cSld>
+    <p:spTree>
+      <p:nvGrpSpPr>
+        <p:cNvPr id="1" name=""/>
+        <p:cNvGrpSpPr/>
+        <p:nvPr/>
+      </p:nvGrpSpPr>
+      <p:grpSpPr>
+        <a:xfrm>
+          <a:off x="0" y="0"/>
+          <a:ext cx="0" cy="0"/>
+          <a:chOff x="0" y="0"/>
+          <a:chExt cx="0" cy="0"/>
+        </a:xfrm>
+      </p:grpSpPr>
+      <p:sp>
+        <p:nvSpPr>
+          <p:cNvPr id="2" name="Title 1"/>
+          <p:cNvSpPr>
+            <a:spLocks noGrp="1"/>
+          </p:cNvSpPr>
+          <p:nvPr>
+            <p:ph type="title"/>
+          </p:nvPr>
+        </p:nvSpPr>
+        <p:spPr>
+          <a:xfrm>
+            <a:off x="628649" y="964938"/>
+            <a:ext cx="8370972" cy="611532"/>
+          </a:xfrm>
+        </p:spPr>
+        <p:txBody>
+          <a:bodyPr/>
+          <a:lstStyle/>
+          <a:p>
+            <a:r>
+              <a:rPr lang="en-US" dirty="0" smtClean="0"/>
+              <a:t>MCS Results – Altitude/Velocity</a:t>
+            </a:r>
+            <a:endParaRPr lang="en-US" dirty="0"/>
+          </a:p>
+        </p:txBody>
+      </p:sp>
+      <p:sp>
+        <p:nvSpPr>
+          <p:cNvPr id="3" name="Content Placeholder 2"/>
+          <p:cNvSpPr>
+            <a:spLocks noGrp="1"/>
+          </p:cNvSpPr>
+          <p:nvPr>
+            <p:ph idx="1"/>
+          </p:nvPr>
+        </p:nvSpPr>
+        <p:spPr>
+          <a:xfrm>
+            <a:off x="628649" y="1690690"/>
+            <a:ext cx="7886700" cy="1437522"/>
+          </a:xfrm>
+        </p:spPr>
+        <p:txBody>
+          <a:bodyPr/>
+          <a:lstStyle/>
+          <a:p>
+            <a:r>
+              <a:rPr lang="en-US" sz="2400" dirty="0" smtClean="0"/>
+              <a:t>Although some trajectories exit the parachute deployment conditions, all but three pass through the box</a:t>
+            </a:r>
+          </a:p>
+          <a:p>
+            <a:pPr lvl="1"/>
+            <a:r>
+              <a:rPr lang="en-US" sz="2000" dirty="0" smtClean="0"/>
+              <a:t>Solved by considering triggering logic that explicitly accounts for parachute conditions </a:t>
+            </a:r>
+          </a:p>
+          <a:p>
+            <a:pPr marL="0" indent="0">
+              <a:buNone/>
+            </a:pPr>
+            <a:endParaRPr lang="en-US" dirty="0"/>
+          </a:p>
+        </p:txBody>
+      </p:sp>
+      <p:pic>
+        <p:nvPicPr>
+          <p:cNvPr id="7" name="Picture 6"/>
+          <p:cNvPicPr>
+            <a:picLocks noChangeAspect="1"/>
+          </p:cNvPicPr>
+          <p:nvPr/>
+        </p:nvPicPr>
+        <p:blipFill>
+          <a:blip r:embed="rId2">
+            <a:extLst>
+              <a:ext uri="{28A0092B-C50C-407E-A947-70E740481C1C}">
+                <a14:useLocalDpi xmlns:a14="http://schemas.microsoft.com/office/drawing/2010/main" val="0"/>
+              </a:ext>
+            </a:extLst>
+          </a:blip>
+          <a:stretch>
+            <a:fillRect/>
+          </a:stretch>
+        </p:blipFill>
+        <p:spPr>
+          <a:xfrm>
+            <a:off x="6015308" y="3001647"/>
+            <a:ext cx="2984313" cy="1856906"/>
+          </a:xfrm>
+          <a:prstGeom prst="rect">
+            <a:avLst/>
+          </a:prstGeom>
+        </p:spPr>
+      </p:pic>
+      <p:pic>
+        <p:nvPicPr>
+          <p:cNvPr id="8" name="Picture 7"/>
+          <p:cNvPicPr>
+            <a:picLocks noChangeAspect="1"/>
+          </p:cNvPicPr>
+          <p:nvPr/>
+        </p:nvPicPr>
+        <p:blipFill>
+          <a:blip r:embed="rId3">
+            <a:extLst>
+              <a:ext uri="{28A0092B-C50C-407E-A947-70E740481C1C}">
+                <a14:useLocalDpi xmlns:a14="http://schemas.microsoft.com/office/drawing/2010/main" val="0"/>
+              </a:ext>
+            </a:extLst>
+          </a:blip>
+          <a:stretch>
+            <a:fillRect/>
+          </a:stretch>
+        </p:blipFill>
+        <p:spPr>
+          <a:xfrm>
+            <a:off x="6015308" y="4858553"/>
+            <a:ext cx="2984313" cy="1856905"/>
+          </a:xfrm>
+          <a:prstGeom prst="rect">
+            <a:avLst/>
+          </a:prstGeom>
+        </p:spPr>
+      </p:pic>
+      <p:pic>
+        <p:nvPicPr>
+          <p:cNvPr id="9" name="Picture 8"/>
+          <p:cNvPicPr>
+            <a:picLocks noChangeAspect="1"/>
+          </p:cNvPicPr>
+          <p:nvPr/>
+        </p:nvPicPr>
+        <p:blipFill>
+          <a:blip r:embed="rId4">
+            <a:extLst>
+              <a:ext uri="{28A0092B-C50C-407E-A947-70E740481C1C}">
+                <a14:useLocalDpi xmlns:a14="http://schemas.microsoft.com/office/drawing/2010/main" val="0"/>
+              </a:ext>
+            </a:extLst>
+          </a:blip>
+          <a:stretch>
+            <a:fillRect/>
+          </a:stretch>
+        </p:blipFill>
+        <p:spPr>
+          <a:xfrm>
+            <a:off x="198640" y="3128212"/>
+            <a:ext cx="5332396" cy="3273687"/>
+          </a:xfrm>
+          <a:prstGeom prst="rect">
+            <a:avLst/>
+          </a:prstGeom>
+        </p:spPr>
+      </p:pic>
+    </p:spTree>
+    <p:extLst>
+      <p:ext uri="{BB962C8B-B14F-4D97-AF65-F5344CB8AC3E}">
+        <p14:creationId xmlns:p14="http://schemas.microsoft.com/office/powerpoint/2010/main" val="303004292"/>
+      </p:ext>
+    </p:extLst>
+  </p:cSld>
+  <p:clrMapOvr>
+    <a:masterClrMapping/>
+  </p:clrMapOvr>
+</p:sld>
+</file>
+
+<file path=ppt/slides/slide19.xml><?xml version="1.0" encoding="utf-8"?>
+<p:sld xmlns:a="http://schemas.openxmlformats.org/drawingml/2006/main" xmlns:r="http://schemas.openxmlformats.org/officeDocument/2006/relationships" xmlns:p="http://schemas.openxmlformats.org/presentationml/2006/main">
+  <p:cSld>
+    <p:spTree>
+      <p:nvGrpSpPr>
+        <p:cNvPr id="1" name=""/>
+        <p:cNvGrpSpPr/>
+        <p:nvPr/>
+      </p:nvGrpSpPr>
+      <p:grpSpPr>
+        <a:xfrm>
+          <a:off x="0" y="0"/>
+          <a:ext cx="0" cy="0"/>
+          <a:chOff x="0" y="0"/>
+          <a:chExt cx="0" cy="0"/>
+        </a:xfrm>
+      </p:grpSpPr>
+      <p:sp>
+        <p:nvSpPr>
+          <p:cNvPr id="2" name="Title 1"/>
+          <p:cNvSpPr>
+            <a:spLocks noGrp="1"/>
+          </p:cNvSpPr>
+          <p:nvPr>
+            <p:ph type="title"/>
+          </p:nvPr>
+        </p:nvSpPr>
+        <p:spPr/>
+        <p:txBody>
+          <a:bodyPr/>
+          <a:lstStyle/>
+          <a:p>
+            <a:r>
+              <a:rPr lang="en-US" dirty="0" smtClean="0"/>
+              <a:t>MCS Results – Bank Profiles </a:t>
+            </a:r>
+            <a:endParaRPr lang="en-US" dirty="0"/>
+          </a:p>
+        </p:txBody>
+      </p:sp>
+      <p:sp>
+        <p:nvSpPr>
+          <p:cNvPr id="5" name="Content Placeholder 4"/>
+          <p:cNvSpPr>
+            <a:spLocks noGrp="1"/>
+          </p:cNvSpPr>
+          <p:nvPr>
+            <p:ph idx="1"/>
+          </p:nvPr>
+        </p:nvSpPr>
+        <p:spPr>
+          <a:xfrm>
+            <a:off x="628650" y="1825625"/>
+            <a:ext cx="8245843" cy="1244834"/>
+          </a:xfrm>
+        </p:spPr>
+        <p:txBody>
+          <a:bodyPr/>
+          <a:lstStyle/>
+          <a:p>
+            <a:r>
+              <a:rPr lang="en-US" dirty="0" smtClean="0"/>
+              <a:t>Largest difference is in the timing of bank reversals</a:t>
+            </a:r>
+          </a:p>
+          <a:p>
+            <a:pPr lvl="0"/>
+            <a:r>
+              <a:rPr lang="en-US" dirty="0">
+                <a:solidFill>
+                  <a:prstClr val="black"/>
+                </a:solidFill>
+              </a:rPr>
+              <a:t>Bank angle (and trajectory in general) deviates from the original trajectory most at the end</a:t>
+            </a:r>
+          </a:p>
+          <a:p>
+            <a:endParaRPr lang="en-US" dirty="0" smtClean="0"/>
+          </a:p>
+          <a:p>
+            <a:endParaRPr lang="en-US" dirty="0"/>
+          </a:p>
+        </p:txBody>
+      </p:sp>
+      <p:pic>
+        <p:nvPicPr>
+          <p:cNvPr id="6" name="Picture 5"/>
+          <p:cNvPicPr>
+            <a:picLocks noChangeAspect="1"/>
+          </p:cNvPicPr>
+          <p:nvPr/>
+        </p:nvPicPr>
+        <p:blipFill>
+          <a:blip r:embed="rId2">
+            <a:extLst>
+              <a:ext uri="{28A0092B-C50C-407E-A947-70E740481C1C}">
+                <a14:useLocalDpi xmlns:a14="http://schemas.microsoft.com/office/drawing/2010/main" val="0"/>
+              </a:ext>
+            </a:extLst>
+          </a:blip>
+          <a:stretch>
+            <a:fillRect/>
+          </a:stretch>
+        </p:blipFill>
+        <p:spPr>
+          <a:xfrm>
+            <a:off x="259880" y="3197993"/>
+            <a:ext cx="5813843" cy="3488306"/>
+          </a:xfrm>
+          <a:prstGeom prst="rect">
+            <a:avLst/>
+          </a:prstGeom>
+        </p:spPr>
+      </p:pic>
+      <p:sp>
+        <p:nvSpPr>
+          <p:cNvPr id="7" name="TextBox 6"/>
+          <p:cNvSpPr txBox="1"/>
+          <p:nvPr/>
+        </p:nvSpPr>
+        <p:spPr>
+          <a:xfrm>
+            <a:off x="5861784" y="3395901"/>
+            <a:ext cx="3205214" cy="2363724"/>
+          </a:xfrm>
+          <a:prstGeom prst="rect">
+            <a:avLst/>
+          </a:prstGeom>
+          <a:noFill/>
+        </p:spPr>
+        <p:txBody>
+          <a:bodyPr wrap="square" rtlCol="0">
+            <a:spAutoFit/>
+          </a:bodyPr>
+          <a:lstStyle/>
+          <a:p>
+            <a:pPr lvl="1">
+              <a:lnSpc>
+                <a:spcPct val="90000"/>
+              </a:lnSpc>
+              <a:spcBef>
+                <a:spcPts val="500"/>
+              </a:spcBef>
+            </a:pPr>
+            <a:r>
+              <a:rPr lang="en-US" sz="2400" dirty="0" smtClean="0">
+                <a:solidFill>
+                  <a:prstClr val="black"/>
+                </a:solidFill>
+              </a:rPr>
+              <a:t>This </a:t>
+            </a:r>
+            <a:r>
+              <a:rPr lang="en-US" sz="2400" dirty="0">
+                <a:solidFill>
+                  <a:prstClr val="black"/>
+                </a:solidFill>
+              </a:rPr>
+              <a:t>is expected because </a:t>
+            </a:r>
+            <a:r>
+              <a:rPr lang="en-US" sz="2400" dirty="0" smtClean="0">
+                <a:solidFill>
+                  <a:prstClr val="black"/>
+                </a:solidFill>
+              </a:rPr>
+              <a:t>the later portion of trajectory is updated the greatest number </a:t>
+            </a:r>
+            <a:r>
+              <a:rPr lang="en-US" sz="2400" dirty="0">
+                <a:solidFill>
+                  <a:prstClr val="black"/>
+                </a:solidFill>
+              </a:rPr>
+              <a:t>of times </a:t>
+            </a:r>
+          </a:p>
+          <a:p>
+            <a:endParaRPr lang="en-US" dirty="0"/>
+          </a:p>
+        </p:txBody>
+      </p:sp>
+    </p:spTree>
+    <p:extLst>
+      <p:ext uri="{BB962C8B-B14F-4D97-AF65-F5344CB8AC3E}">
+        <p14:creationId xmlns:p14="http://schemas.microsoft.com/office/powerpoint/2010/main" val="1145173546"/>
+      </p:ext>
+    </p:extLst>
+  </p:cSld>
+  <p:clrMapOvr>
+    <a:masterClrMapping/>
+  </p:clrMapOvr>
+</p:sld>
+</file>
+
+<file path=ppt/slides/slide2.xml><?xml version="1.0" encoding="utf-8"?>
+<p:sld xmlns:a="http://schemas.openxmlformats.org/drawingml/2006/main" xmlns:r="http://schemas.openxmlformats.org/officeDocument/2006/relationships" xmlns:p="http://schemas.openxmlformats.org/presentationml/2006/main">
+  <p:cSld>
+    <p:spTree>
+      <p:nvGrpSpPr>
+        <p:cNvPr id="1" name=""/>
+        <p:cNvGrpSpPr/>
+        <p:nvPr/>
+      </p:nvGrpSpPr>
+      <p:grpSpPr>
+        <a:xfrm>
+          <a:off x="0" y="0"/>
+          <a:ext cx="0" cy="0"/>
+          <a:chOff x="0" y="0"/>
+          <a:chExt cx="0" cy="0"/>
+        </a:xfrm>
+      </p:grpSpPr>
+      <p:sp>
+        <p:nvSpPr>
+          <p:cNvPr id="2" name="Title 1"/>
+          <p:cNvSpPr>
+            <a:spLocks noGrp="1"/>
+          </p:cNvSpPr>
+          <p:nvPr>
+            <p:ph type="title"/>
+          </p:nvPr>
+        </p:nvSpPr>
+        <p:spPr>
+          <a:xfrm>
+            <a:off x="628650" y="1079156"/>
+            <a:ext cx="7886700" cy="1248407"/>
+          </a:xfrm>
+        </p:spPr>
+        <p:txBody>
+          <a:bodyPr/>
+          <a:lstStyle/>
+          <a:p>
+            <a:r>
+              <a:rPr lang="en-US" dirty="0" smtClean="0"/>
+              <a:t>Switch Time Optimization for Rapid Trajectory Design</a:t>
+            </a:r>
+            <a:endParaRPr lang="en-US" dirty="0"/>
+          </a:p>
+        </p:txBody>
+      </p:sp>
+      <p:sp>
+        <p:nvSpPr>
+          <p:cNvPr id="3" name="Content Placeholder 2"/>
+          <p:cNvSpPr>
+            <a:spLocks noGrp="1"/>
+          </p:cNvSpPr>
+          <p:nvPr>
+            <p:ph idx="1"/>
+          </p:nvPr>
+        </p:nvSpPr>
+        <p:spPr>
+          <a:xfrm>
+            <a:off x="628650" y="2576944"/>
+            <a:ext cx="7886700" cy="4281055"/>
+          </a:xfrm>
+        </p:spPr>
+        <p:txBody>
+          <a:bodyPr/>
+          <a:lstStyle/>
+          <a:p>
+            <a:r>
+              <a:rPr lang="en-US" dirty="0" smtClean="0"/>
+              <a:t>Simple </a:t>
+            </a:r>
+            <a:r>
+              <a:rPr lang="en-US" dirty="0" err="1" smtClean="0"/>
+              <a:t>parametrization</a:t>
+            </a:r>
+            <a:r>
+              <a:rPr lang="en-US" dirty="0" smtClean="0"/>
+              <a:t> for robust, near-optimal altitude performance intended for parachute architectures </a:t>
+            </a:r>
+          </a:p>
+          <a:p>
+            <a:r>
+              <a:rPr lang="en-US" dirty="0" smtClean="0"/>
+              <a:t>Can show that this </a:t>
+            </a:r>
+            <a:r>
+              <a:rPr lang="en-US" dirty="0" err="1" smtClean="0"/>
+              <a:t>parametrization</a:t>
+            </a:r>
+            <a:r>
+              <a:rPr lang="en-US" dirty="0" smtClean="0"/>
+              <a:t> also allows for near-optimal minimum velocity performance, suitable for SRP applications</a:t>
+            </a:r>
+          </a:p>
+          <a:p>
+            <a:r>
+              <a:rPr lang="en-US" dirty="0" smtClean="0"/>
+              <a:t>If-then logic used is discontinuous; </a:t>
+            </a:r>
+            <a:r>
+              <a:rPr lang="en-US" dirty="0" err="1" smtClean="0"/>
+              <a:t>Nelder</a:t>
+            </a:r>
+            <a:r>
+              <a:rPr lang="en-US" dirty="0" smtClean="0"/>
+              <a:t>-Mead simplex method has been used for optimization</a:t>
+            </a:r>
+          </a:p>
+          <a:p>
+            <a:r>
+              <a:rPr lang="en-US" dirty="0" smtClean="0"/>
+              <a:t>Results from hybrid OC literature suggest a gradient based solution is possible and preferable </a:t>
+            </a:r>
+            <a:endParaRPr lang="en-US" dirty="0"/>
+          </a:p>
+        </p:txBody>
+      </p:sp>
+    </p:spTree>
+    <p:extLst>
+      <p:ext uri="{BB962C8B-B14F-4D97-AF65-F5344CB8AC3E}">
+        <p14:creationId xmlns:p14="http://schemas.microsoft.com/office/powerpoint/2010/main" val="949813023"/>
+      </p:ext>
+    </p:extLst>
+  </p:cSld>
+  <p:clrMapOvr>
+    <a:masterClrMapping/>
+  </p:clrMapOvr>
+</p:sld>
+</file>
+
+<file path=ppt/slides/slide20.xml><?xml version="1.0" encoding="utf-8"?>
+<p:sld xmlns:a="http://schemas.openxmlformats.org/drawingml/2006/main" xmlns:r="http://schemas.openxmlformats.org/officeDocument/2006/relationships" xmlns:p="http://schemas.openxmlformats.org/presentationml/2006/main">
+  <p:cSld>
+    <p:spTree>
+      <p:nvGrpSpPr>
+        <p:cNvPr id="1" name=""/>
+        <p:cNvGrpSpPr/>
+        <p:nvPr/>
+      </p:nvGrpSpPr>
+      <p:grpSpPr>
+        <a:xfrm>
+          <a:off x="0" y="0"/>
+          <a:ext cx="0" cy="0"/>
+          <a:chOff x="0" y="0"/>
+          <a:chExt cx="0" cy="0"/>
+        </a:xfrm>
+      </p:grpSpPr>
+      <p:sp>
+        <p:nvSpPr>
+          <p:cNvPr id="2" name="Title 1"/>
+          <p:cNvSpPr>
+            <a:spLocks noGrp="1"/>
+          </p:cNvSpPr>
+          <p:nvPr>
+            <p:ph type="title"/>
+          </p:nvPr>
+        </p:nvSpPr>
+        <p:spPr/>
+        <p:txBody>
+          <a:bodyPr/>
+          <a:lstStyle/>
+          <a:p>
+            <a:r>
+              <a:rPr lang="en-US" dirty="0" smtClean="0"/>
               <a:t>Conclusion</a:t>
             </a:r>
             <a:endParaRPr lang="en-US" dirty="0"/>
@@ -5746,7 +6382,7 @@
 </p:sld>
 </file>
 
-<file path=ppt/slides/slide17.xml><?xml version="1.0" encoding="utf-8"?>
+<file path=ppt/slides/slide21.xml><?xml version="1.0" encoding="utf-8"?>
 <p:sld xmlns:a="http://schemas.openxmlformats.org/drawingml/2006/main" xmlns:r="http://schemas.openxmlformats.org/officeDocument/2006/relationships" xmlns:p="http://schemas.openxmlformats.org/presentationml/2006/main">
   <p:cSld>
     <p:spTree>
@@ -6435,7 +7071,7 @@
 </p:sld>
 </file>
 
-<file path=ppt/slides/slide18.xml><?xml version="1.0" encoding="utf-8"?>
+<file path=ppt/slides/slide22.xml><?xml version="1.0" encoding="utf-8"?>
 <p:sld xmlns:a="http://schemas.openxmlformats.org/drawingml/2006/main" xmlns:r="http://schemas.openxmlformats.org/officeDocument/2006/relationships" xmlns:p="http://schemas.openxmlformats.org/presentationml/2006/main">
   <p:cSld>
     <p:spTree>
@@ -7054,127 +7690,6 @@
 </p:sld>
 </file>
 
-<file path=ppt/slides/slide2.xml><?xml version="1.0" encoding="utf-8"?>
-<p:sld xmlns:a="http://schemas.openxmlformats.org/drawingml/2006/main" xmlns:r="http://schemas.openxmlformats.org/officeDocument/2006/relationships" xmlns:p="http://schemas.openxmlformats.org/presentationml/2006/main">
-  <p:cSld>
-    <p:spTree>
-      <p:nvGrpSpPr>
-        <p:cNvPr id="1" name=""/>
-        <p:cNvGrpSpPr/>
-        <p:nvPr/>
-      </p:nvGrpSpPr>
-      <p:grpSpPr>
-        <a:xfrm>
-          <a:off x="0" y="0"/>
-          <a:ext cx="0" cy="0"/>
-          <a:chOff x="0" y="0"/>
-          <a:chExt cx="0" cy="0"/>
-        </a:xfrm>
-      </p:grpSpPr>
-      <p:sp>
-        <p:nvSpPr>
-          <p:cNvPr id="2" name="Title 1"/>
-          <p:cNvSpPr>
-            <a:spLocks noGrp="1"/>
-          </p:cNvSpPr>
-          <p:nvPr>
-            <p:ph type="title"/>
-          </p:nvPr>
-        </p:nvSpPr>
-        <p:spPr/>
-        <p:txBody>
-          <a:bodyPr/>
-          <a:lstStyle/>
-          <a:p>
-            <a:r>
-              <a:rPr lang="en-US" dirty="0"/>
-              <a:t>V</a:t>
-            </a:r>
-            <a:r>
-              <a:rPr lang="en-US" dirty="0" smtClean="0"/>
-              <a:t>ariance Minimization</a:t>
-            </a:r>
-            <a:endParaRPr lang="en-US" dirty="0"/>
-          </a:p>
-        </p:txBody>
-      </p:sp>
-      <p:sp>
-        <p:nvSpPr>
-          <p:cNvPr id="3" name="Content Placeholder 2"/>
-          <p:cNvSpPr>
-            <a:spLocks noGrp="1"/>
-          </p:cNvSpPr>
-          <p:nvPr>
-            <p:ph idx="1"/>
-          </p:nvPr>
-        </p:nvSpPr>
-        <p:spPr>
-          <a:xfrm>
-            <a:off x="628650" y="1825624"/>
-            <a:ext cx="7886700" cy="4857397"/>
-          </a:xfrm>
-        </p:spPr>
-        <p:txBody>
-          <a:bodyPr/>
-          <a:lstStyle/>
-          <a:p>
-            <a:r>
-              <a:rPr lang="en-US" dirty="0" smtClean="0"/>
-              <a:t>Consider first the LTV case, with unconstrained control</a:t>
-            </a:r>
-          </a:p>
-          <a:p>
-            <a:r>
-              <a:rPr lang="en-US" dirty="0" smtClean="0"/>
-              <a:t>For suitable choice of norm on the final covariance matrix, the problem </a:t>
-            </a:r>
-            <a:r>
-              <a:rPr lang="en-US" smtClean="0"/>
-              <a:t>reduces to </a:t>
-            </a:r>
-            <a:r>
-              <a:rPr lang="en-US" dirty="0" smtClean="0"/>
-              <a:t>standard LQR with a particular boundary condition</a:t>
-            </a:r>
-          </a:p>
-          <a:p>
-            <a:pPr lvl="1"/>
-            <a:r>
-              <a:rPr lang="en-US" dirty="0" smtClean="0"/>
-              <a:t>The required norm is the trace operator</a:t>
-            </a:r>
-          </a:p>
-          <a:p>
-            <a:pPr lvl="1"/>
-            <a:r>
-              <a:rPr lang="en-US" dirty="0" smtClean="0"/>
-              <a:t>The LQ state weight matrix Q = I</a:t>
-            </a:r>
-          </a:p>
-          <a:p>
-            <a:r>
-              <a:rPr lang="en-US" dirty="0" smtClean="0"/>
-              <a:t>The trace is a suitable choice in many cases. Geometrically, it is related to the size of the covariance ellipse, while ignoring directional information</a:t>
-            </a:r>
-          </a:p>
-          <a:p>
-            <a:endParaRPr lang="en-US" dirty="0" smtClean="0"/>
-          </a:p>
-        </p:txBody>
-      </p:sp>
-    </p:spTree>
-    <p:extLst>
-      <p:ext uri="{BB962C8B-B14F-4D97-AF65-F5344CB8AC3E}">
-        <p14:creationId xmlns:p14="http://schemas.microsoft.com/office/powerpoint/2010/main" val="3096368325"/>
-      </p:ext>
-    </p:extLst>
-  </p:cSld>
-  <p:clrMapOvr>
-    <a:masterClrMapping/>
-  </p:clrMapOvr>
-</p:sld>
-</file>
-
 <file path=ppt/slides/slide3.xml><?xml version="1.0" encoding="utf-8"?>
 <p:sld xmlns:a="http://schemas.openxmlformats.org/drawingml/2006/main" xmlns:r="http://schemas.openxmlformats.org/officeDocument/2006/relationships" xmlns:p="http://schemas.openxmlformats.org/presentationml/2006/main">
   <p:cSld>
@@ -7202,14 +7717,19 @@
             <p:ph type="title"/>
           </p:nvPr>
         </p:nvSpPr>
-        <p:spPr/>
+        <p:spPr>
+          <a:xfrm>
+            <a:off x="628650" y="1079156"/>
+            <a:ext cx="7886700" cy="1231781"/>
+          </a:xfrm>
+        </p:spPr>
         <p:txBody>
           <a:bodyPr/>
           <a:lstStyle/>
           <a:p>
             <a:r>
               <a:rPr lang="en-US" dirty="0" smtClean="0"/>
-              <a:t>Trace Norm</a:t>
+              <a:t>Chance Constrained Nonlinear Optimal Control</a:t>
             </a:r>
             <a:endParaRPr lang="en-US" dirty="0"/>
           </a:p>
@@ -7225,29 +7745,16 @@
             <p:ph idx="1"/>
           </p:nvPr>
         </p:nvSpPr>
-        <p:spPr/>
-        <p:txBody>
-          <a:bodyPr/>
-          <a:lstStyle/>
-          <a:p>
-            <a:r>
-              <a:rPr lang="en-US" dirty="0" smtClean="0"/>
-              <a:t>From the broader class of </a:t>
-            </a:r>
-            <a:r>
-              <a:rPr lang="en-US" dirty="0" err="1" smtClean="0"/>
-              <a:t>Schatten</a:t>
-            </a:r>
-            <a:r>
-              <a:rPr lang="en-US" dirty="0" smtClean="0"/>
-              <a:t> p-norms with p=1</a:t>
-            </a:r>
-          </a:p>
-          <a:p>
-            <a:r>
-              <a:rPr lang="en-US" dirty="0" smtClean="0"/>
-              <a:t>Also called the nuclear norm, equal to the sum of the singular values (= eigenvalues because covariance is positive semi-definite)</a:t>
-            </a:r>
+        <p:spPr>
+          <a:xfrm>
+            <a:off x="628650" y="2510443"/>
+            <a:ext cx="7886700" cy="3666519"/>
+          </a:xfrm>
+        </p:spPr>
+        <p:txBody>
+          <a:bodyPr/>
+          <a:lstStyle/>
+          <a:p>
             <a:endParaRPr lang="en-US" dirty="0"/>
           </a:p>
         </p:txBody>
@@ -7255,7 +7762,7 @@
     </p:spTree>
     <p:extLst>
       <p:ext uri="{BB962C8B-B14F-4D97-AF65-F5344CB8AC3E}">
-        <p14:creationId xmlns:p14="http://schemas.microsoft.com/office/powerpoint/2010/main" val="3713997120"/>
+        <p14:creationId xmlns:p14="http://schemas.microsoft.com/office/powerpoint/2010/main" val="3996060571"/>
       </p:ext>
     </p:extLst>
   </p:cSld>
@@ -7298,6 +7805,217 @@
           <a:lstStyle/>
           <a:p>
             <a:r>
+              <a:rPr lang="en-US" dirty="0"/>
+              <a:t>V</a:t>
+            </a:r>
+            <a:r>
+              <a:rPr lang="en-US" dirty="0" smtClean="0"/>
+              <a:t>ariance Minimization</a:t>
+            </a:r>
+            <a:endParaRPr lang="en-US" dirty="0"/>
+          </a:p>
+        </p:txBody>
+      </p:sp>
+      <p:sp>
+        <p:nvSpPr>
+          <p:cNvPr id="3" name="Content Placeholder 2"/>
+          <p:cNvSpPr>
+            <a:spLocks noGrp="1"/>
+          </p:cNvSpPr>
+          <p:nvPr>
+            <p:ph idx="1"/>
+          </p:nvPr>
+        </p:nvSpPr>
+        <p:spPr>
+          <a:xfrm>
+            <a:off x="628650" y="1825624"/>
+            <a:ext cx="7886700" cy="4857397"/>
+          </a:xfrm>
+        </p:spPr>
+        <p:txBody>
+          <a:bodyPr/>
+          <a:lstStyle/>
+          <a:p>
+            <a:r>
+              <a:rPr lang="en-US" dirty="0" smtClean="0"/>
+              <a:t>Consider first the LTV case, with unconstrained control</a:t>
+            </a:r>
+          </a:p>
+          <a:p>
+            <a:r>
+              <a:rPr lang="en-US" dirty="0" smtClean="0"/>
+              <a:t>For suitable choice of norm on the final covariance matrix, the problem </a:t>
+            </a:r>
+            <a:r>
+              <a:rPr lang="en-US" smtClean="0"/>
+              <a:t>reduces to </a:t>
+            </a:r>
+            <a:r>
+              <a:rPr lang="en-US" dirty="0" smtClean="0"/>
+              <a:t>standard LQR with a particular boundary condition</a:t>
+            </a:r>
+          </a:p>
+          <a:p>
+            <a:pPr lvl="1"/>
+            <a:r>
+              <a:rPr lang="en-US" dirty="0" smtClean="0"/>
+              <a:t>The required norm is the trace operator</a:t>
+            </a:r>
+          </a:p>
+          <a:p>
+            <a:pPr lvl="1"/>
+            <a:r>
+              <a:rPr lang="en-US" dirty="0" smtClean="0"/>
+              <a:t>The LQ state weight matrix Q = I</a:t>
+            </a:r>
+          </a:p>
+          <a:p>
+            <a:r>
+              <a:rPr lang="en-US" dirty="0" smtClean="0"/>
+              <a:t>The trace is a suitable choice in many cases. Geometrically, it is related to the size of the covariance ellipse, while ignoring directional information</a:t>
+            </a:r>
+          </a:p>
+          <a:p>
+            <a:endParaRPr lang="en-US" dirty="0" smtClean="0"/>
+          </a:p>
+        </p:txBody>
+      </p:sp>
+    </p:spTree>
+    <p:extLst>
+      <p:ext uri="{BB962C8B-B14F-4D97-AF65-F5344CB8AC3E}">
+        <p14:creationId xmlns:p14="http://schemas.microsoft.com/office/powerpoint/2010/main" val="3096368325"/>
+      </p:ext>
+    </p:extLst>
+  </p:cSld>
+  <p:clrMapOvr>
+    <a:masterClrMapping/>
+  </p:clrMapOvr>
+</p:sld>
+</file>
+
+<file path=ppt/slides/slide5.xml><?xml version="1.0" encoding="utf-8"?>
+<p:sld xmlns:a="http://schemas.openxmlformats.org/drawingml/2006/main" xmlns:r="http://schemas.openxmlformats.org/officeDocument/2006/relationships" xmlns:p="http://schemas.openxmlformats.org/presentationml/2006/main">
+  <p:cSld>
+    <p:spTree>
+      <p:nvGrpSpPr>
+        <p:cNvPr id="1" name=""/>
+        <p:cNvGrpSpPr/>
+        <p:nvPr/>
+      </p:nvGrpSpPr>
+      <p:grpSpPr>
+        <a:xfrm>
+          <a:off x="0" y="0"/>
+          <a:ext cx="0" cy="0"/>
+          <a:chOff x="0" y="0"/>
+          <a:chExt cx="0" cy="0"/>
+        </a:xfrm>
+      </p:grpSpPr>
+      <p:sp>
+        <p:nvSpPr>
+          <p:cNvPr id="2" name="Title 1"/>
+          <p:cNvSpPr>
+            <a:spLocks noGrp="1"/>
+          </p:cNvSpPr>
+          <p:nvPr>
+            <p:ph type="title"/>
+          </p:nvPr>
+        </p:nvSpPr>
+        <p:spPr/>
+        <p:txBody>
+          <a:bodyPr/>
+          <a:lstStyle/>
+          <a:p>
+            <a:r>
+              <a:rPr lang="en-US" dirty="0" smtClean="0"/>
+              <a:t>Trace Norm</a:t>
+            </a:r>
+            <a:endParaRPr lang="en-US" dirty="0"/>
+          </a:p>
+        </p:txBody>
+      </p:sp>
+      <p:sp>
+        <p:nvSpPr>
+          <p:cNvPr id="3" name="Content Placeholder 2"/>
+          <p:cNvSpPr>
+            <a:spLocks noGrp="1"/>
+          </p:cNvSpPr>
+          <p:nvPr>
+            <p:ph idx="1"/>
+          </p:nvPr>
+        </p:nvSpPr>
+        <p:spPr/>
+        <p:txBody>
+          <a:bodyPr/>
+          <a:lstStyle/>
+          <a:p>
+            <a:r>
+              <a:rPr lang="en-US" dirty="0" smtClean="0"/>
+              <a:t>From the broader class of </a:t>
+            </a:r>
+            <a:r>
+              <a:rPr lang="en-US" dirty="0" err="1" smtClean="0"/>
+              <a:t>Schatten</a:t>
+            </a:r>
+            <a:r>
+              <a:rPr lang="en-US" dirty="0" smtClean="0"/>
+              <a:t> p-norms with p=1</a:t>
+            </a:r>
+          </a:p>
+          <a:p>
+            <a:r>
+              <a:rPr lang="en-US" dirty="0" smtClean="0"/>
+              <a:t>Also called the nuclear norm, equal to the sum of the singular values (= eigenvalues because covariance is positive semi-definite)</a:t>
+            </a:r>
+            <a:endParaRPr lang="en-US" dirty="0"/>
+          </a:p>
+        </p:txBody>
+      </p:sp>
+    </p:spTree>
+    <p:extLst>
+      <p:ext uri="{BB962C8B-B14F-4D97-AF65-F5344CB8AC3E}">
+        <p14:creationId xmlns:p14="http://schemas.microsoft.com/office/powerpoint/2010/main" val="3713997120"/>
+      </p:ext>
+    </p:extLst>
+  </p:cSld>
+  <p:clrMapOvr>
+    <a:masterClrMapping/>
+  </p:clrMapOvr>
+</p:sld>
+</file>
+
+<file path=ppt/slides/slide6.xml><?xml version="1.0" encoding="utf-8"?>
+<p:sld xmlns:a="http://schemas.openxmlformats.org/drawingml/2006/main" xmlns:r="http://schemas.openxmlformats.org/officeDocument/2006/relationships" xmlns:p="http://schemas.openxmlformats.org/presentationml/2006/main">
+  <p:cSld>
+    <p:spTree>
+      <p:nvGrpSpPr>
+        <p:cNvPr id="1" name=""/>
+        <p:cNvGrpSpPr/>
+        <p:nvPr/>
+      </p:nvGrpSpPr>
+      <p:grpSpPr>
+        <a:xfrm>
+          <a:off x="0" y="0"/>
+          <a:ext cx="0" cy="0"/>
+          <a:chOff x="0" y="0"/>
+          <a:chExt cx="0" cy="0"/>
+        </a:xfrm>
+      </p:grpSpPr>
+      <p:sp>
+        <p:nvSpPr>
+          <p:cNvPr id="2" name="Title 1"/>
+          <p:cNvSpPr>
+            <a:spLocks noGrp="1"/>
+          </p:cNvSpPr>
+          <p:nvPr>
+            <p:ph type="title"/>
+          </p:nvPr>
+        </p:nvSpPr>
+        <p:spPr/>
+        <p:txBody>
+          <a:bodyPr/>
+          <a:lstStyle/>
+          <a:p>
+            <a:r>
               <a:rPr lang="en-US" dirty="0" smtClean="0"/>
               <a:t>Variance Minimization</a:t>
             </a:r>
@@ -7394,7 +8112,119 @@
 </p:sld>
 </file>
 
-<file path=ppt/slides/slide5.xml><?xml version="1.0" encoding="utf-8"?>
+<file path=ppt/slides/slide7.xml><?xml version="1.0" encoding="utf-8"?>
+<p:sld xmlns:a="http://schemas.openxmlformats.org/drawingml/2006/main" xmlns:r="http://schemas.openxmlformats.org/officeDocument/2006/relationships" xmlns:p="http://schemas.openxmlformats.org/presentationml/2006/main">
+  <p:cSld>
+    <p:spTree>
+      <p:nvGrpSpPr>
+        <p:cNvPr id="1" name=""/>
+        <p:cNvGrpSpPr/>
+        <p:nvPr/>
+      </p:nvGrpSpPr>
+      <p:grpSpPr>
+        <a:xfrm>
+          <a:off x="0" y="0"/>
+          <a:ext cx="0" cy="0"/>
+          <a:chOff x="0" y="0"/>
+          <a:chExt cx="0" cy="0"/>
+        </a:xfrm>
+      </p:grpSpPr>
+      <p:sp>
+        <p:nvSpPr>
+          <p:cNvPr id="2" name="Title 1"/>
+          <p:cNvSpPr>
+            <a:spLocks noGrp="1"/>
+          </p:cNvSpPr>
+          <p:nvPr>
+            <p:ph type="title"/>
+          </p:nvPr>
+        </p:nvSpPr>
+        <p:spPr/>
+        <p:txBody>
+          <a:bodyPr/>
+          <a:lstStyle/>
+          <a:p>
+            <a:r>
+              <a:rPr lang="en-US" dirty="0" smtClean="0"/>
+              <a:t>Applications</a:t>
+            </a:r>
+            <a:endParaRPr lang="en-US" dirty="0"/>
+          </a:p>
+        </p:txBody>
+      </p:sp>
+      <p:sp>
+        <p:nvSpPr>
+          <p:cNvPr id="3" name="Content Placeholder 2"/>
+          <p:cNvSpPr>
+            <a:spLocks noGrp="1"/>
+          </p:cNvSpPr>
+          <p:nvPr>
+            <p:ph idx="1"/>
+          </p:nvPr>
+        </p:nvSpPr>
+        <p:spPr/>
+        <p:txBody>
+          <a:bodyPr/>
+          <a:lstStyle/>
+          <a:p>
+            <a:r>
+              <a:rPr lang="en-US" dirty="0" smtClean="0"/>
+              <a:t>Powered descent vehicle design seeks to minimize propellant use under uncertainty </a:t>
+            </a:r>
+          </a:p>
+          <a:p>
+            <a:pPr lvl="1"/>
+            <a:r>
+              <a:rPr lang="en-US" dirty="0" smtClean="0"/>
+              <a:t>J = -m(</a:t>
+            </a:r>
+            <a:r>
+              <a:rPr lang="en-US" dirty="0" err="1" smtClean="0"/>
+              <a:t>tf</a:t>
+            </a:r>
+            <a:r>
+              <a:rPr lang="en-US" dirty="0" smtClean="0"/>
+              <a:t>) + </a:t>
+            </a:r>
+            <a:r>
+              <a:rPr lang="en-US" dirty="0" err="1" smtClean="0"/>
+              <a:t>nV</a:t>
+            </a:r>
+            <a:r>
+              <a:rPr lang="en-US" dirty="0" smtClean="0"/>
+              <a:t>[m]</a:t>
+            </a:r>
+          </a:p>
+          <a:p>
+            <a:r>
+              <a:rPr lang="en-US" dirty="0" smtClean="0"/>
+              <a:t>Powered descent guidance</a:t>
+            </a:r>
+          </a:p>
+          <a:p>
+            <a:pPr lvl="1"/>
+            <a:r>
+              <a:rPr lang="en-US" dirty="0" smtClean="0"/>
+              <a:t>J =</a:t>
+            </a:r>
+            <a:endParaRPr lang="en-US" dirty="0"/>
+          </a:p>
+        </p:txBody>
+      </p:sp>
+    </p:spTree>
+    <p:extLst>
+      <p:ext uri="{BB962C8B-B14F-4D97-AF65-F5344CB8AC3E}">
+        <p14:creationId xmlns:p14="http://schemas.microsoft.com/office/powerpoint/2010/main" val="3220044604"/>
+      </p:ext>
+    </p:extLst>
+  </p:cSld>
+  <p:clrMapOvr>
+    <a:masterClrMapping/>
+  </p:clrMapOvr>
+</p:sld>
+</file>
+
+<file path=ppt/slides/slide8.xml><?xml version="1.0" encoding="utf-8"?>
 <p:sld xmlns:a="http://schemas.openxmlformats.org/drawingml/2006/main" xmlns:r="http://schemas.openxmlformats.org/officeDocument/2006/relationships" xmlns:p="http://schemas.openxmlformats.org/presentationml/2006/main">
   <p:cSld>
     <p:spTree>
@@ -7736,7 +8566,7 @@
         <p:spPr>
           <a:xfrm>
             <a:off x="6145822" y="2185307"/>
-            <a:ext cx="1500091" cy="300082"/>
+            <a:ext cx="2206758" cy="300082"/>
           </a:xfrm>
           <a:prstGeom prst="rect">
             <a:avLst/>
@@ -7749,13 +8579,21 @@
           </a:bodyPr>
           <a:lstStyle/>
           <a:p>
+            <a:r>
+              <a:rPr lang="en-US" sz="1350" dirty="0" smtClean="0">
+                <a:solidFill>
+                  <a:srgbClr val="FF0000"/>
+                </a:solidFill>
+              </a:rPr>
+              <a:t>Constraint boundary, </a:t>
+            </a:r>
             <a:r>
               <a:rPr lang="en-US" sz="1350" dirty="0">
                 <a:solidFill>
                   <a:srgbClr val="FF0000"/>
                 </a:solidFill>
               </a:rPr>
-              <a:t>Constraint, c(x) = 0</a:t>
+              <a:t>c(x) = 0</a:t>
             </a:r>
           </a:p>
         </p:txBody>
@@ -7826,8 +8664,8 @@
         </p:nvSpPr>
         <p:spPr>
           <a:xfrm>
-            <a:off x="960237" y="1242353"/>
-            <a:ext cx="1438985" cy="507831"/>
+            <a:off x="909616" y="2173406"/>
+            <a:ext cx="1093815" cy="507831"/>
           </a:xfrm>
           <a:prstGeom prst="rect">
             <a:avLst/>
@@ -7843,9 +8681,7 @@
             <a:r>
               <a:rPr lang="en-US" sz="1350" dirty="0">
                 <a:solidFill>
-                  <a:schemeClr val="accent1">
-                    <a:lumMod val="75000"/>
-                  </a:schemeClr>
+                  <a:schemeClr val="bg1"/>
                 </a:solidFill>
               </a:rPr>
               <a:t>Subset with probability P</a:t>
@@ -7861,8 +8697,8 @@
         </p:nvSpPr>
         <p:spPr>
           <a:xfrm>
-            <a:off x="543365" y="4634426"/>
-            <a:ext cx="6664325" cy="1131079"/>
+            <a:off x="346194" y="4009206"/>
+            <a:ext cx="7669759" cy="1131079"/>
           </a:xfrm>
           <a:prstGeom prst="rect">
             <a:avLst/>
@@ -7870,7 +8706,7 @@
           <a:noFill/>
         </p:spPr>
         <p:txBody>
-          <a:bodyPr wrap="none" rtlCol="0">
+          <a:bodyPr wrap="square" rtlCol="0">
             <a:spAutoFit/>
           </a:bodyPr>
           <a:lstStyle/>
@@ -7887,7 +8723,15 @@
             </a:pPr>
             <a:r>
               <a:rPr lang="en-US" sz="1350" dirty="0"/>
-              <a:t>Given: an initial set and a constraint to be satisfied with probability P</a:t>
+              <a:t>Given: an </a:t>
+            </a:r>
+            <a:r>
+              <a:rPr lang="en-US" sz="1350" dirty="0" smtClean="0"/>
+              <a:t>initial uncertainty set (possibly unbounded) </a:t>
+            </a:r>
+            <a:r>
+              <a:rPr lang="en-US" sz="1350" dirty="0"/>
+              <a:t>and a constraint to be satisfied with probability P</a:t>
             </a:r>
           </a:p>
           <a:p>
@@ -7917,8 +8761,21 @@
             </a:pPr>
             <a:r>
               <a:rPr lang="en-US" sz="1350" dirty="0"/>
-              <a:t>If the subset does not violate the constraints, then the probabilistic constraint is satisfied</a:t>
-            </a:r>
+              <a:t>If the </a:t>
+            </a:r>
+            <a:r>
+              <a:rPr lang="en-US" sz="1350" dirty="0" smtClean="0"/>
+              <a:t>mapped subset </a:t>
+            </a:r>
+            <a:r>
+              <a:rPr lang="en-US" sz="1350" dirty="0"/>
+              <a:t>does not violate the constraints, then the probabilistic constraint is </a:t>
+            </a:r>
+            <a:r>
+              <a:rPr lang="en-US" sz="1350" dirty="0" smtClean="0"/>
+              <a:t>satisfied</a:t>
+            </a:r>
+            <a:endParaRPr lang="en-US" sz="1350" dirty="0"/>
           </a:p>
         </p:txBody>
       </p:sp>
@@ -8001,7 +8858,7 @@
         </p:nvSpPr>
         <p:spPr>
           <a:xfrm>
-            <a:off x="5846316" y="2677525"/>
+            <a:off x="5945170" y="2688771"/>
             <a:ext cx="2160399" cy="507831"/>
           </a:xfrm>
           <a:prstGeom prst="rect">
@@ -8023,7 +8880,27 @@
                   </a:schemeClr>
                 </a:solidFill>
               </a:rPr>
-              <a:t>This subset satisfies c(x) &lt; 0 with probability at least P</a:t>
+              <a:t>This subset satisfies c(x) &lt; 0 with probability </a:t>
+            </a:r>
+            <a:r>
+              <a:rPr lang="en-US" sz="1350" u="sng" dirty="0">
+                <a:solidFill>
+                  <a:schemeClr val="accent1">
+                    <a:lumMod val="75000"/>
+                  </a:schemeClr>
+                </a:solidFill>
+              </a:rPr>
+              <a:t>at least</a:t>
+            </a:r>
+            <a:r>
+              <a:rPr lang="en-US" sz="1350" dirty="0">
+                <a:solidFill>
+                  <a:schemeClr val="accent1">
+                    <a:lumMod val="75000"/>
+                  </a:schemeClr>
+                </a:solidFill>
+              </a:rPr>
+              <a:t> P</a:t>
             </a:r>
           </a:p>
         </p:txBody>
@@ -8083,404 +8960,84 @@
           </a:p>
         </p:txBody>
       </p:sp>
+      <p:cxnSp>
+        <p:nvCxnSpPr>
+          <p:cNvPr id="10" name="Straight Arrow Connector 9"/>
+          <p:cNvCxnSpPr/>
+          <p:nvPr/>
+        </p:nvCxnSpPr>
+        <p:spPr>
+          <a:xfrm flipH="1" flipV="1">
+            <a:off x="5488415" y="2724399"/>
+            <a:ext cx="456755" cy="91818"/>
+          </a:xfrm>
+          <a:prstGeom prst="straightConnector1">
+            <a:avLst/>
+          </a:prstGeom>
+          <a:ln>
+            <a:tailEnd type="triangle"/>
+          </a:ln>
+        </p:spPr>
+        <p:style>
+          <a:lnRef idx="1">
+            <a:schemeClr val="accent1"/>
+          </a:lnRef>
+          <a:fillRef idx="0">
+            <a:schemeClr val="accent1"/>
+          </a:fillRef>
+          <a:effectRef idx="0">
+            <a:schemeClr val="accent1"/>
+          </a:effectRef>
+          <a:fontRef idx="minor">
+            <a:schemeClr val="tx1"/>
+          </a:fontRef>
+        </p:style>
+      </p:cxnSp>
+      <p:sp>
+        <p:nvSpPr>
+          <p:cNvPr id="23" name="TextBox 22"/>
+          <p:cNvSpPr txBox="1"/>
+          <p:nvPr/>
+        </p:nvSpPr>
+        <p:spPr>
+          <a:xfrm>
+            <a:off x="6532509" y="5707863"/>
+            <a:ext cx="2010413" cy="938719"/>
+          </a:xfrm>
+          <a:prstGeom prst="rect">
+            <a:avLst/>
+          </a:prstGeom>
+          <a:noFill/>
+        </p:spPr>
+        <p:txBody>
+          <a:bodyPr wrap="square" rtlCol="0">
+            <a:spAutoFit/>
+          </a:bodyPr>
+          <a:lstStyle/>
+          <a:p>
+            <a:r>
+              <a:rPr lang="en-US" sz="1100" dirty="0" smtClean="0"/>
+              <a:t>If F(x) </a:t>
+            </a:r>
+            <a:r>
+              <a:rPr lang="en-US" sz="1100" dirty="0"/>
+              <a:t>is injective, the constraint is satisfied with probability P, i.e., no conservatism is </a:t>
+            </a:r>
+            <a:r>
+              <a:rPr lang="en-US" sz="1100" dirty="0" smtClean="0"/>
+              <a:t>introduced</a:t>
+            </a:r>
+            <a:endParaRPr lang="en-US" sz="1100" dirty="0"/>
+          </a:p>
+          <a:p>
+            <a:endParaRPr lang="en-US" sz="1100" dirty="0"/>
+          </a:p>
+        </p:txBody>
+      </p:sp>
     </p:spTree>
     <p:extLst>
       <p:ext uri="{BB962C8B-B14F-4D97-AF65-F5344CB8AC3E}">
         <p14:creationId xmlns:p14="http://schemas.microsoft.com/office/powerpoint/2010/main" val="2776971855"/>
-      </p:ext>
-    </p:extLst>
-  </p:cSld>
-  <p:clrMapOvr>
-    <a:masterClrMapping/>
-  </p:clrMapOvr>
-</p:sld>
-</file>
-
-<file path=ppt/slides/slide6.xml><?xml version="1.0" encoding="utf-8"?>
-<p:sld xmlns:a="http://schemas.openxmlformats.org/drawingml/2006/main" xmlns:r="http://schemas.openxmlformats.org/officeDocument/2006/relationships" xmlns:p="http://schemas.openxmlformats.org/presentationml/2006/main">
-  <p:cSld>
-    <p:spTree>
-      <p:nvGrpSpPr>
-        <p:cNvPr id="1" name=""/>
-        <p:cNvGrpSpPr/>
-        <p:nvPr/>
-      </p:nvGrpSpPr>
-      <p:grpSpPr>
-        <a:xfrm>
-          <a:off x="0" y="0"/>
-          <a:ext cx="0" cy="0"/>
-          <a:chOff x="0" y="0"/>
-          <a:chExt cx="0" cy="0"/>
-        </a:xfrm>
-      </p:grpSpPr>
-      <p:sp>
-        <p:nvSpPr>
-          <p:cNvPr id="2" name="Title 1"/>
-          <p:cNvSpPr>
-            <a:spLocks noGrp="1"/>
-          </p:cNvSpPr>
-          <p:nvPr>
-            <p:ph type="title"/>
-          </p:nvPr>
-        </p:nvSpPr>
-        <p:spPr/>
-        <p:txBody>
-          <a:bodyPr/>
-          <a:lstStyle/>
-          <a:p>
-            <a:r>
-              <a:rPr lang="en-US" dirty="0" smtClean="0"/>
-              <a:t>Introduction</a:t>
-            </a:r>
-            <a:endParaRPr lang="en-US" dirty="0"/>
-          </a:p>
-        </p:txBody>
-      </p:sp>
-      <p:sp>
-        <p:nvSpPr>
-          <p:cNvPr id="3" name="Content Placeholder 2"/>
-          <p:cNvSpPr>
-            <a:spLocks noGrp="1"/>
-          </p:cNvSpPr>
-          <p:nvPr>
-            <p:ph idx="1"/>
-          </p:nvPr>
-        </p:nvSpPr>
-        <p:spPr/>
-        <p:txBody>
-          <a:bodyPr/>
-          <a:lstStyle/>
-          <a:p>
-            <a:r>
-              <a:rPr lang="en-US" dirty="0" smtClean="0"/>
-              <a:t>Future Mars missions will have challenging requirements that necessitate closed-loop entry guidance</a:t>
-            </a:r>
-          </a:p>
-          <a:p>
-            <a:r>
-              <a:rPr lang="en-US" dirty="0" smtClean="0"/>
-              <a:t>The ability to design a trajectory onboard increases autonomy and can be used in entry guidance</a:t>
-            </a:r>
-          </a:p>
-          <a:p>
-            <a:pPr lvl="1"/>
-            <a:r>
-              <a:rPr lang="en-US" dirty="0" smtClean="0"/>
-              <a:t>Trajectory generation can be used in reference tracking methods, or as the basis for a numerical predictor-corrector method via frequent design</a:t>
-            </a:r>
-          </a:p>
-          <a:p>
-            <a:r>
-              <a:rPr lang="en-US" dirty="0" smtClean="0"/>
-              <a:t>Generating an optimal trajectory onboard is difficult due to limited computing resources</a:t>
-            </a:r>
-          </a:p>
-          <a:p>
-            <a:endParaRPr lang="en-US" dirty="0" smtClean="0"/>
-          </a:p>
-          <a:p>
-            <a:endParaRPr lang="en-US" dirty="0"/>
-          </a:p>
-        </p:txBody>
-      </p:sp>
-    </p:spTree>
-    <p:extLst>
-      <p:ext uri="{BB962C8B-B14F-4D97-AF65-F5344CB8AC3E}">
-        <p14:creationId xmlns:p14="http://schemas.microsoft.com/office/powerpoint/2010/main" val="2368961217"/>
-      </p:ext>
-    </p:extLst>
-  </p:cSld>
-  <p:clrMapOvr>
-    <a:masterClrMapping/>
-  </p:clrMapOvr>
-  <p:timing>
-    <p:tnLst>
-      <p:par>
-        <p:cTn id="1" dur="indefinite" restart="never" nodeType="tmRoot"/>
-      </p:par>
-    </p:tnLst>
-  </p:timing>
-</p:sld>
-</file>
-
-<file path=ppt/slides/slide7.xml><?xml version="1.0" encoding="utf-8"?>
-<p:sld xmlns:a="http://schemas.openxmlformats.org/drawingml/2006/main" xmlns:r="http://schemas.openxmlformats.org/officeDocument/2006/relationships" xmlns:p="http://schemas.openxmlformats.org/presentationml/2006/main">
-  <p:cSld>
-    <p:spTree>
-      <p:nvGrpSpPr>
-        <p:cNvPr id="1" name=""/>
-        <p:cNvGrpSpPr/>
-        <p:nvPr/>
-      </p:nvGrpSpPr>
-      <p:grpSpPr>
-        <a:xfrm>
-          <a:off x="0" y="0"/>
-          <a:ext cx="0" cy="0"/>
-          <a:chOff x="0" y="0"/>
-          <a:chExt cx="0" cy="0"/>
-        </a:xfrm>
-      </p:grpSpPr>
-      <p:sp>
-        <p:nvSpPr>
-          <p:cNvPr id="2" name="Title 1"/>
-          <p:cNvSpPr>
-            <a:spLocks noGrp="1"/>
-          </p:cNvSpPr>
-          <p:nvPr>
-            <p:ph type="title"/>
-          </p:nvPr>
-        </p:nvSpPr>
-        <p:spPr/>
-        <p:txBody>
-          <a:bodyPr/>
-          <a:lstStyle/>
-          <a:p>
-            <a:r>
-              <a:rPr lang="en-US" dirty="0" smtClean="0"/>
-              <a:t>Entry Trajectory Updating</a:t>
-            </a:r>
-            <a:endParaRPr lang="en-US" dirty="0"/>
-          </a:p>
-        </p:txBody>
-      </p:sp>
-      <p:sp>
-        <p:nvSpPr>
-          <p:cNvPr id="3" name="Content Placeholder 2"/>
-          <p:cNvSpPr>
-            <a:spLocks noGrp="1"/>
-          </p:cNvSpPr>
-          <p:nvPr>
-            <p:ph idx="1"/>
-          </p:nvPr>
-        </p:nvSpPr>
-        <p:spPr>
-          <a:xfrm>
-            <a:off x="628650" y="1792119"/>
-            <a:ext cx="8361346" cy="5561582"/>
-          </a:xfrm>
-        </p:spPr>
-        <p:txBody>
-          <a:bodyPr/>
-          <a:lstStyle/>
-          <a:p>
-            <a:r>
-              <a:rPr lang="en-US" dirty="0" smtClean="0"/>
-              <a:t>The vehicle enters the atmosphere with a trajectory designed that will deliver it to the target under nominal conditions </a:t>
-            </a:r>
-          </a:p>
-          <a:p>
-            <a:r>
-              <a:rPr lang="en-US" dirty="0"/>
-              <a:t>Under off-nominal conditions, the vehicle will deviate from the trajectory that was planned, </a:t>
-            </a:r>
-            <a:r>
-              <a:rPr lang="en-US" dirty="0" smtClean="0"/>
-              <a:t>sometimes even </a:t>
-            </a:r>
-            <a:r>
-              <a:rPr lang="en-US" dirty="0"/>
-              <a:t>with the aid of </a:t>
-            </a:r>
-            <a:r>
-              <a:rPr lang="en-US" dirty="0" smtClean="0"/>
-              <a:t>closed-loop guidance </a:t>
-            </a:r>
-          </a:p>
-          <a:p>
-            <a:pPr lvl="1"/>
-            <a:r>
-              <a:rPr lang="en-US" dirty="0" smtClean="0"/>
-              <a:t>Vehicle may arrive at the target under poor conditions (e.g. outside of parachute deployment conditions) or may violate important path constraints </a:t>
-            </a:r>
-          </a:p>
-          <a:p>
-            <a:r>
-              <a:rPr lang="en-US" dirty="0" smtClean="0"/>
-              <a:t>Goal: use current estimated vehicle state and redesign a path to the target while satisfying constraints (e.g. parachute deploy conditions, path constraints)</a:t>
-            </a:r>
-          </a:p>
-          <a:p>
-            <a:endParaRPr lang="en-US" dirty="0" smtClean="0"/>
-          </a:p>
-        </p:txBody>
-      </p:sp>
-    </p:spTree>
-    <p:extLst>
-      <p:ext uri="{BB962C8B-B14F-4D97-AF65-F5344CB8AC3E}">
-        <p14:creationId xmlns:p14="http://schemas.microsoft.com/office/powerpoint/2010/main" val="1411460258"/>
-      </p:ext>
-    </p:extLst>
-  </p:cSld>
-  <p:clrMapOvr>
-    <a:masterClrMapping/>
-  </p:clrMapOvr>
-</p:sld>
-</file>
-
-<file path=ppt/slides/slide8.xml><?xml version="1.0" encoding="utf-8"?>
-<p:sld xmlns:a="http://schemas.openxmlformats.org/drawingml/2006/main" xmlns:r="http://schemas.openxmlformats.org/officeDocument/2006/relationships" xmlns:p="http://schemas.openxmlformats.org/presentationml/2006/main">
-  <p:cSld>
-    <p:spTree>
-      <p:nvGrpSpPr>
-        <p:cNvPr id="1" name=""/>
-        <p:cNvGrpSpPr/>
-        <p:nvPr/>
-      </p:nvGrpSpPr>
-      <p:grpSpPr>
-        <a:xfrm>
-          <a:off x="0" y="0"/>
-          <a:ext cx="0" cy="0"/>
-          <a:chOff x="0" y="0"/>
-          <a:chExt cx="0" cy="0"/>
-        </a:xfrm>
-      </p:grpSpPr>
-      <p:sp>
-        <p:nvSpPr>
-          <p:cNvPr id="2" name="Title 1"/>
-          <p:cNvSpPr>
-            <a:spLocks noGrp="1"/>
-          </p:cNvSpPr>
-          <p:nvPr>
-            <p:ph type="title"/>
-          </p:nvPr>
-        </p:nvSpPr>
-        <p:spPr>
-          <a:xfrm>
-            <a:off x="628650" y="1079157"/>
-            <a:ext cx="7886700" cy="853160"/>
-          </a:xfrm>
-        </p:spPr>
-        <p:txBody>
-          <a:bodyPr/>
-          <a:lstStyle/>
-          <a:p>
-            <a:r>
-              <a:rPr lang="en-US" dirty="0" smtClean="0"/>
-              <a:t>Proposed Approach</a:t>
-            </a:r>
-            <a:endParaRPr lang="en-US" dirty="0"/>
-          </a:p>
-        </p:txBody>
-      </p:sp>
-      <p:sp>
-        <p:nvSpPr>
-          <p:cNvPr id="3" name="Content Placeholder 2"/>
-          <p:cNvSpPr>
-            <a:spLocks noGrp="1"/>
-          </p:cNvSpPr>
-          <p:nvPr>
-            <p:ph idx="1"/>
-          </p:nvPr>
-        </p:nvSpPr>
-        <p:spPr>
-          <a:xfrm>
-            <a:off x="628650" y="1916153"/>
-            <a:ext cx="7886700" cy="4792655"/>
-          </a:xfrm>
-        </p:spPr>
-        <p:txBody>
-          <a:bodyPr/>
-          <a:lstStyle/>
-          <a:p>
-            <a:r>
-              <a:rPr lang="en-US" sz="2400" dirty="0" smtClean="0"/>
-              <a:t>Trajectory update is posed an optimal control problem</a:t>
-            </a:r>
-          </a:p>
-          <a:p>
-            <a:pPr lvl="1"/>
-            <a:r>
-              <a:rPr lang="en-US" sz="2000" dirty="0" smtClean="0"/>
-              <a:t>Objective is to minimize distance to original trajectory while satisfying constraints </a:t>
-            </a:r>
-          </a:p>
-          <a:p>
-            <a:r>
-              <a:rPr lang="en-US" sz="2400" dirty="0" smtClean="0"/>
-              <a:t>Use energy as independent variable </a:t>
-            </a:r>
-          </a:p>
-          <a:p>
-            <a:r>
-              <a:rPr lang="en-US" sz="2400" dirty="0" err="1" smtClean="0"/>
-              <a:t>Convexify</a:t>
-            </a:r>
-            <a:r>
-              <a:rPr lang="en-US" sz="2400" dirty="0" smtClean="0"/>
-              <a:t> </a:t>
-            </a:r>
-          </a:p>
-          <a:p>
-            <a:pPr lvl="1"/>
-            <a:r>
-              <a:rPr lang="en-US" sz="2000" dirty="0" smtClean="0"/>
-              <a:t>Treat bank angle as additional state, use bank rate as the control variable</a:t>
-            </a:r>
-          </a:p>
-          <a:p>
-            <a:pPr lvl="1"/>
-            <a:r>
-              <a:rPr lang="en-US" sz="2000" dirty="0" smtClean="0"/>
-              <a:t>Linearize the equations of motion </a:t>
-            </a:r>
-          </a:p>
-          <a:p>
-            <a:pPr lvl="1"/>
-            <a:r>
-              <a:rPr lang="en-US" sz="2000" dirty="0" smtClean="0"/>
-              <a:t>Unlike powered descent case, </a:t>
-            </a:r>
-            <a:r>
-              <a:rPr lang="en-US" sz="2000" dirty="0" err="1" smtClean="0"/>
-              <a:t>convexification</a:t>
-            </a:r>
-            <a:r>
-              <a:rPr lang="en-US" sz="2000" dirty="0" smtClean="0"/>
-              <a:t> is not lossless </a:t>
-            </a:r>
-          </a:p>
-          <a:p>
-            <a:r>
-              <a:rPr lang="en-US" sz="2400" dirty="0" smtClean="0"/>
-              <a:t>Discretize (or transcribe) into second-order cone program</a:t>
-            </a:r>
-          </a:p>
-          <a:p>
-            <a:pPr lvl="1"/>
-            <a:r>
-              <a:rPr lang="en-US" sz="2000" dirty="0" err="1" smtClean="0"/>
-              <a:t>Chebyshev</a:t>
-            </a:r>
-            <a:r>
-              <a:rPr lang="en-US" sz="2000" dirty="0" smtClean="0"/>
-              <a:t> </a:t>
-            </a:r>
-            <a:r>
-              <a:rPr lang="en-US" sz="2000" dirty="0" err="1"/>
-              <a:t>p</a:t>
-            </a:r>
-            <a:r>
-              <a:rPr lang="en-US" sz="2000" dirty="0" err="1" smtClean="0"/>
-              <a:t>seudospectral</a:t>
-            </a:r>
-            <a:r>
-              <a:rPr lang="en-US" sz="2000" dirty="0" smtClean="0"/>
-              <a:t> method </a:t>
-            </a:r>
-          </a:p>
-          <a:p>
-            <a:r>
-              <a:rPr lang="en-US" sz="2400" dirty="0" smtClean="0"/>
-              <a:t>Solve the resulting SOCP using efficient interior-point solver</a:t>
-            </a:r>
-            <a:endParaRPr lang="en-US" sz="2400" dirty="0"/>
-          </a:p>
-        </p:txBody>
-      </p:sp>
-    </p:spTree>
-    <p:extLst>
-      <p:ext uri="{BB962C8B-B14F-4D97-AF65-F5344CB8AC3E}">
-        <p14:creationId xmlns:p14="http://schemas.microsoft.com/office/powerpoint/2010/main" val="3047953510"/>
       </p:ext>
     </p:extLst>
   </p:cSld>
@@ -8509,84 +9066,333 @@
       </p:grpSpPr>
       <p:sp>
         <p:nvSpPr>
-          <p:cNvPr id="2" name="Title 1"/>
-          <p:cNvSpPr>
-            <a:spLocks noGrp="1"/>
-          </p:cNvSpPr>
-          <p:nvPr>
-            <p:ph type="title"/>
-          </p:nvPr>
-        </p:nvSpPr>
-        <p:spPr/>
-        <p:txBody>
-          <a:bodyPr/>
+          <p:cNvPr id="2" name="TextBox 1"/>
+          <p:cNvSpPr txBox="1"/>
+          <p:nvPr/>
+        </p:nvSpPr>
+        <p:spPr>
+          <a:xfrm>
+            <a:off x="271848" y="1261760"/>
+            <a:ext cx="4805803" cy="369332"/>
+          </a:xfrm>
+          <a:prstGeom prst="rect">
+            <a:avLst/>
+          </a:prstGeom>
+          <a:noFill/>
+        </p:spPr>
+        <p:txBody>
+          <a:bodyPr wrap="none" rtlCol="0">
+            <a:spAutoFit/>
+          </a:bodyPr>
           <a:lstStyle/>
           <a:p>
             <a:r>
               <a:rPr lang="en-US" dirty="0" smtClean="0"/>
-              <a:t>Convex Optimization </a:t>
+              <a:t>Tractable approximation for Gaussian uncertainty</a:t>
             </a:r>
             <a:endParaRPr lang="en-US" dirty="0"/>
           </a:p>
         </p:txBody>
       </p:sp>
-      <p:sp>
-        <p:nvSpPr>
-          <p:cNvPr id="3" name="Content Placeholder 2"/>
-          <p:cNvSpPr>
-            <a:spLocks noGrp="1"/>
-          </p:cNvSpPr>
-          <p:nvPr>
-            <p:ph idx="1"/>
-          </p:nvPr>
-        </p:nvSpPr>
-        <p:spPr/>
-        <p:txBody>
-          <a:bodyPr/>
-          <a:lstStyle/>
-          <a:p>
-            <a:r>
-              <a:rPr lang="en-US" sz="2400" dirty="0" smtClean="0"/>
-              <a:t>(Iterative) Convex optimization approaches to non-convex optimal control problems have exploded in interest due to efficient, polynomial time solvers and guaranteed global solution when the problem is feasible</a:t>
-            </a:r>
-          </a:p>
-          <a:p>
-            <a:r>
-              <a:rPr lang="en-US" sz="2400" dirty="0" smtClean="0"/>
-              <a:t>A variety of aerospace problems have been solved including ascent trajectory design, powered descent trajectory design, interplanetary transfers, and entry</a:t>
-            </a:r>
-          </a:p>
-          <a:p>
-            <a:r>
-              <a:rPr lang="en-US" sz="2400" dirty="0" smtClean="0"/>
-              <a:t>While these convex optimization guarantees solution of feasible sub-problems, not all methods have guaranteed convergence, and those that do typically require an </a:t>
-            </a:r>
-            <a:r>
-              <a:rPr lang="en-US" sz="2400" dirty="0"/>
-              <a:t>unknown number of </a:t>
-            </a:r>
-            <a:r>
-              <a:rPr lang="en-US" sz="2400" dirty="0" smtClean="0"/>
-              <a:t>iterations</a:t>
-            </a:r>
-          </a:p>
-          <a:p>
-            <a:pPr lvl="1"/>
-            <a:r>
-              <a:rPr lang="en-US" sz="2000" dirty="0" smtClean="0"/>
-              <a:t>The proposed approach does not involve multiple iterations</a:t>
-            </a:r>
-            <a:endParaRPr lang="en-US" sz="2000" dirty="0"/>
-          </a:p>
-          <a:p>
-            <a:endParaRPr lang="en-US" dirty="0"/>
-          </a:p>
-        </p:txBody>
-      </p:sp>
+      <mc:AlternateContent xmlns:mc="http://schemas.openxmlformats.org/markup-compatibility/2006">
+        <mc:Choice xmlns:a14="http://schemas.microsoft.com/office/drawing/2010/main" Requires="a14">
+          <p:sp>
+            <p:nvSpPr>
+              <p:cNvPr id="3" name="TextBox 2"/>
+              <p:cNvSpPr txBox="1"/>
+              <p:nvPr/>
+            </p:nvSpPr>
+            <p:spPr>
+              <a:xfrm>
+                <a:off x="2759676" y="2726724"/>
+                <a:ext cx="5486400" cy="1754326"/>
+              </a:xfrm>
+              <a:prstGeom prst="rect">
+                <a:avLst/>
+              </a:prstGeom>
+              <a:noFill/>
+            </p:spPr>
+            <p:txBody>
+              <a:bodyPr wrap="square" rtlCol="0">
+                <a:spAutoFit/>
+              </a:bodyPr>
+              <a:lstStyle/>
+              <a:p>
+                <a:r>
+                  <a:rPr lang="en-US" dirty="0" smtClean="0"/>
+                  <a:t>For a given precision matrix </a:t>
+                </a:r>
+                <a14:m>
+                  <m:oMath xmlns:m="http://schemas.openxmlformats.org/officeDocument/2006/math">
+                    <m:r>
+                      <a:rPr lang="en-US" b="0" i="1" smtClean="0">
+                        <a:latin typeface="Cambria Math" panose="02040503050406030204" pitchFamily="18" charset="0"/>
+                      </a:rPr>
+                      <m:t>𝑃</m:t>
+                    </m:r>
+                    <m:r>
+                      <a:rPr lang="en-US" b="0" i="1" smtClean="0">
+                        <a:latin typeface="Cambria Math" panose="02040503050406030204" pitchFamily="18" charset="0"/>
+                      </a:rPr>
+                      <m:t>=</m:t>
+                    </m:r>
+                    <m:sSup>
+                      <m:sSupPr>
+                        <m:ctrlPr>
+                          <a:rPr lang="en-US" b="0" i="1" smtClean="0">
+                            <a:latin typeface="Cambria Math" panose="02040503050406030204" pitchFamily="18" charset="0"/>
+                          </a:rPr>
+                        </m:ctrlPr>
+                      </m:sSupPr>
+                      <m:e>
+                        <m:r>
+                          <a:rPr lang="en-US" b="0" i="1" smtClean="0">
+                            <a:latin typeface="Cambria Math" panose="02040503050406030204" pitchFamily="18" charset="0"/>
+                          </a:rPr>
+                          <m:t>𝐶</m:t>
+                        </m:r>
+                      </m:e>
+                      <m:sup>
+                        <m:r>
+                          <a:rPr lang="en-US" b="0" i="1" smtClean="0">
+                            <a:latin typeface="Cambria Math" panose="02040503050406030204" pitchFamily="18" charset="0"/>
+                          </a:rPr>
+                          <m:t>−1</m:t>
+                        </m:r>
+                      </m:sup>
+                    </m:sSup>
+                  </m:oMath>
+                </a14:m>
+                <a:r>
+                  <a:rPr lang="en-US" dirty="0" smtClean="0"/>
+                  <a:t>,  we can associate an ellipsoidal set </a:t>
+                </a:r>
+                <a14:m>
+                  <m:oMath xmlns:m="http://schemas.openxmlformats.org/officeDocument/2006/math">
+                    <m:r>
+                      <m:rPr>
+                        <m:sty m:val="p"/>
+                      </m:rPr>
+                      <a:rPr lang="en-US" b="0" i="0" smtClean="0">
+                        <a:latin typeface="Cambria Math" panose="02040503050406030204" pitchFamily="18" charset="0"/>
+                      </a:rPr>
+                      <m:t>E</m:t>
+                    </m:r>
+                    <m:r>
+                      <a:rPr lang="en-US" b="0" i="0" smtClean="0">
+                        <a:latin typeface="Cambria Math" panose="02040503050406030204" pitchFamily="18" charset="0"/>
+                      </a:rPr>
+                      <m:t>= </m:t>
+                    </m:r>
+                    <m:d>
+                      <m:dPr>
+                        <m:begChr m:val="{"/>
+                        <m:endChr m:val="}"/>
+                        <m:ctrlPr>
+                          <a:rPr lang="en-US" i="1" smtClean="0">
+                            <a:latin typeface="Cambria Math" panose="02040503050406030204" pitchFamily="18" charset="0"/>
+                          </a:rPr>
+                        </m:ctrlPr>
+                      </m:dPr>
+                      <m:e>
+                        <m:sSup>
+                          <m:sSupPr>
+                            <m:ctrlPr>
+                              <a:rPr lang="en-US" i="1" smtClean="0">
+                                <a:latin typeface="Cambria Math" panose="02040503050406030204" pitchFamily="18" charset="0"/>
+                              </a:rPr>
+                            </m:ctrlPr>
+                          </m:sSupPr>
+                          <m:e>
+                            <m:r>
+                              <a:rPr lang="en-US" b="0" i="1" smtClean="0">
+                                <a:latin typeface="Cambria Math" panose="02040503050406030204" pitchFamily="18" charset="0"/>
+                              </a:rPr>
+                              <m:t>𝑥</m:t>
+                            </m:r>
+                            <m:r>
+                              <a:rPr lang="en-US" b="0" i="1" smtClean="0">
+                                <a:latin typeface="Cambria Math" panose="02040503050406030204" pitchFamily="18" charset="0"/>
+                              </a:rPr>
+                              <m:t> | </m:t>
+                            </m:r>
+                            <m:r>
+                              <a:rPr lang="en-US" b="0" i="1" smtClean="0">
+                                <a:latin typeface="Cambria Math" panose="02040503050406030204" pitchFamily="18" charset="0"/>
+                              </a:rPr>
+                              <m:t>𝑥</m:t>
+                            </m:r>
+                          </m:e>
+                          <m:sup>
+                            <m:r>
+                              <a:rPr lang="en-US" b="0" i="1" smtClean="0">
+                                <a:latin typeface="Cambria Math" panose="02040503050406030204" pitchFamily="18" charset="0"/>
+                              </a:rPr>
+                              <m:t>𝑇</m:t>
+                            </m:r>
+                          </m:sup>
+                        </m:sSup>
+                        <m:r>
+                          <a:rPr lang="en-US" b="0" i="1" smtClean="0">
+                            <a:latin typeface="Cambria Math" panose="02040503050406030204" pitchFamily="18" charset="0"/>
+                          </a:rPr>
+                          <m:t>𝑃𝑥</m:t>
+                        </m:r>
+                        <m:r>
+                          <a:rPr lang="en-US" b="0" i="1" smtClean="0">
+                            <a:latin typeface="Cambria Math" panose="02040503050406030204" pitchFamily="18" charset="0"/>
+                          </a:rPr>
+                          <m:t>≤</m:t>
+                        </m:r>
+                        <m:sSup>
+                          <m:sSupPr>
+                            <m:ctrlPr>
+                              <a:rPr lang="en-US" b="0" i="1" smtClean="0">
+                                <a:latin typeface="Cambria Math" panose="02040503050406030204" pitchFamily="18" charset="0"/>
+                              </a:rPr>
+                            </m:ctrlPr>
+                          </m:sSupPr>
+                          <m:e>
+                            <m:r>
+                              <a:rPr lang="en-US" b="0" i="1" smtClean="0">
+                                <a:latin typeface="Cambria Math" panose="02040503050406030204" pitchFamily="18" charset="0"/>
+                              </a:rPr>
+                              <m:t>𝑟</m:t>
+                            </m:r>
+                          </m:e>
+                          <m:sup>
+                            <m:r>
+                              <a:rPr lang="en-US" b="0" i="1" smtClean="0">
+                                <a:latin typeface="Cambria Math" panose="02040503050406030204" pitchFamily="18" charset="0"/>
+                              </a:rPr>
+                              <m:t>2</m:t>
+                            </m:r>
+                          </m:sup>
+                        </m:sSup>
+                      </m:e>
+                    </m:d>
+                  </m:oMath>
+                </a14:m>
+                <a:r>
+                  <a:rPr lang="en-US" dirty="0" smtClean="0"/>
+                  <a:t>. </a:t>
+                </a:r>
+              </a:p>
+              <a:p>
+                <a:endParaRPr lang="en-US" dirty="0"/>
+              </a:p>
+              <a:p>
+                <a:r>
+                  <a:rPr lang="en-US" dirty="0" smtClean="0"/>
+                  <a:t>We can also compute the radius r such that the ellipsoid contains a given fraction of the total probability, i.e. </a:t>
+                </a:r>
+                <a14:m>
+                  <m:oMath xmlns:m="http://schemas.openxmlformats.org/officeDocument/2006/math">
+                    <m:r>
+                      <a:rPr lang="en-US" b="0" i="1" smtClean="0">
+                        <a:latin typeface="Cambria Math" panose="02040503050406030204" pitchFamily="18" charset="0"/>
+                      </a:rPr>
+                      <m:t>𝑃</m:t>
+                    </m:r>
+                    <m:d>
+                      <m:dPr>
+                        <m:begChr m:val="["/>
+                        <m:endChr m:val="]"/>
+                        <m:ctrlPr>
+                          <a:rPr lang="en-US" b="0" i="1" smtClean="0">
+                            <a:latin typeface="Cambria Math" panose="02040503050406030204" pitchFamily="18" charset="0"/>
+                          </a:rPr>
+                        </m:ctrlPr>
+                      </m:dPr>
+                      <m:e>
+                        <m:r>
+                          <a:rPr lang="en-US" b="0" i="1" smtClean="0">
+                            <a:latin typeface="Cambria Math" panose="02040503050406030204" pitchFamily="18" charset="0"/>
+                          </a:rPr>
+                          <m:t>𝑥</m:t>
+                        </m:r>
+                        <m:r>
+                          <a:rPr lang="en-US" b="0" i="1" smtClean="0">
+                            <a:latin typeface="Cambria Math" panose="02040503050406030204" pitchFamily="18" charset="0"/>
+                          </a:rPr>
+                          <m:t>∈</m:t>
+                        </m:r>
+                        <m:r>
+                          <a:rPr lang="en-US" b="0" i="1" smtClean="0">
+                            <a:latin typeface="Cambria Math" panose="02040503050406030204" pitchFamily="18" charset="0"/>
+                          </a:rPr>
+                          <m:t>𝐸</m:t>
+                        </m:r>
+                      </m:e>
+                    </m:d>
+                    <m:r>
+                      <a:rPr lang="en-US" b="0" i="1" smtClean="0">
+                        <a:latin typeface="Cambria Math" panose="02040503050406030204" pitchFamily="18" charset="0"/>
+                      </a:rPr>
+                      <m:t>=1−</m:t>
+                    </m:r>
+                    <m:r>
+                      <a:rPr lang="en-US" b="0" i="1" smtClean="0">
+                        <a:latin typeface="Cambria Math" panose="02040503050406030204" pitchFamily="18" charset="0"/>
+                      </a:rPr>
+                      <m:t>𝛿</m:t>
+                    </m:r>
+                    <m:r>
+                      <a:rPr lang="en-US" b="0" i="1" smtClean="0">
+                        <a:latin typeface="Cambria Math" panose="02040503050406030204" pitchFamily="18" charset="0"/>
+                      </a:rPr>
+                      <m:t> </m:t>
+                    </m:r>
+                  </m:oMath>
+                </a14:m>
+                <a:endParaRPr lang="en-US" dirty="0"/>
+              </a:p>
+            </p:txBody>
+          </p:sp>
+        </mc:Choice>
+        <mc:Fallback>
+          <p:sp>
+            <p:nvSpPr>
+              <p:cNvPr id="3" name="TextBox 2"/>
+              <p:cNvSpPr txBox="1">
+                <a:spLocks noRot="1" noChangeAspect="1" noMove="1" noResize="1" noEditPoints="1" noAdjustHandles="1" noChangeArrowheads="1" noChangeShapeType="1" noTextEdit="1"/>
+              </p:cNvSpPr>
+              <p:nvPr/>
+            </p:nvSpPr>
+            <p:spPr>
+              <a:xfrm>
+                <a:off x="2759676" y="2726724"/>
+                <a:ext cx="5486400" cy="1754326"/>
+              </a:xfrm>
+              <a:prstGeom prst="rect">
+                <a:avLst/>
+              </a:prstGeom>
+              <a:blipFill rotWithShape="0">
+                <a:blip r:embed="rId2"/>
+                <a:stretch>
+                  <a:fillRect l="-1000" t="-1736" r="-111"/>
+                </a:stretch>
+              </a:blipFill>
+            </p:spPr>
+            <p:txBody>
+              <a:bodyPr/>
+              <a:lstStyle/>
+              <a:p>
+                <a:r>
+                  <a:rPr lang="en-US">
+                    <a:noFill/>
+                  </a:rPr>
+                  <a:t> </a:t>
+                </a:r>
+              </a:p>
+            </p:txBody>
+          </p:sp>
+        </mc:Fallback>
+      </mc:AlternateContent>
     </p:spTree>
     <p:extLst>
       <p:ext uri="{BB962C8B-B14F-4D97-AF65-F5344CB8AC3E}">
-        <p14:creationId xmlns:p14="http://schemas.microsoft.com/office/powerpoint/2010/main" val="3747838991"/>
+        <p14:creationId xmlns:p14="http://schemas.microsoft.com/office/powerpoint/2010/main" val="4074423147"/>
       </p:ext>
     </p:extLst>
   </p:cSld>

</xml_diff>